<commit_message>
Created 1st part of training
</commit_message>
<xml_diff>
--- a/docs/Presentation.pptx
+++ b/docs/Presentation.pptx
@@ -6,15 +6,9 @@
   </p:sldMasterIdLst>
   <p:sldIdLst>
     <p:sldId id="256" r:id="rId2"/>
-    <p:sldId id="259" r:id="rId3"/>
-    <p:sldId id="257" r:id="rId4"/>
-    <p:sldId id="258" r:id="rId5"/>
-    <p:sldId id="264" r:id="rId6"/>
-    <p:sldId id="260" r:id="rId7"/>
-    <p:sldId id="265" r:id="rId8"/>
-    <p:sldId id="261" r:id="rId9"/>
-    <p:sldId id="262" r:id="rId10"/>
-    <p:sldId id="263" r:id="rId11"/>
+    <p:sldId id="261" r:id="rId3"/>
+    <p:sldId id="262" r:id="rId4"/>
+    <p:sldId id="263" r:id="rId5"/>
   </p:sldIdLst>
   <p:sldSz cx="12192000" cy="6858000"/>
   <p:notesSz cx="6858000" cy="9144000"/>
@@ -5834,7 +5828,7 @@
             </a:br>
             <a:r>
               <a:rPr lang="en-US" sz="3200" u="sng" dirty="0"/>
-              <a:t>Part 1 : Classic Monolith</a:t>
+              <a:t>Part 2 : Spring Services</a:t>
             </a:r>
             <a:endParaRPr lang="en-US" u="sng" dirty="0"/>
           </a:p>
@@ -5856,15 +5850,17 @@
             <p:ph type="subTitle" idx="1"/>
           </p:nvPr>
         </p:nvSpPr>
-        <p:spPr/>
+        <p:spPr>
+          <a:xfrm>
+            <a:off x="1507067" y="4172756"/>
+            <a:ext cx="7766936" cy="1096896"/>
+          </a:xfrm>
+        </p:spPr>
         <p:txBody>
           <a:bodyPr>
-            <a:normAutofit lnSpcReduction="10000"/>
+            <a:normAutofit/>
           </a:bodyPr>
           <a:lstStyle/>
-          <a:p>
-            <a:endParaRPr lang="en-US" dirty="0"/>
-          </a:p>
           <a:p>
             <a:r>
               <a:rPr lang="en-US" dirty="0"/>
@@ -5892,7 +5888,390 @@
 </p:sld>
 </file>
 
-<file path=ppt/slides/slide10.xml><?xml version="1.0" encoding="utf-8"?>
+<file path=ppt/slides/slide2.xml><?xml version="1.0" encoding="utf-8"?>
+<p:sld xmlns:a="http://schemas.openxmlformats.org/drawingml/2006/main" xmlns:r="http://schemas.openxmlformats.org/officeDocument/2006/relationships" xmlns:p="http://schemas.openxmlformats.org/presentationml/2006/main">
+  <p:cSld>
+    <p:spTree>
+      <p:nvGrpSpPr>
+        <p:cNvPr id="1" name=""/>
+        <p:cNvGrpSpPr/>
+        <p:nvPr/>
+      </p:nvGrpSpPr>
+      <p:grpSpPr>
+        <a:xfrm>
+          <a:off x="0" y="0"/>
+          <a:ext cx="0" cy="0"/>
+          <a:chOff x="0" y="0"/>
+          <a:chExt cx="0" cy="0"/>
+        </a:xfrm>
+      </p:grpSpPr>
+      <p:sp>
+        <p:nvSpPr>
+          <p:cNvPr id="2" name="Title 1">
+            <a:extLst>
+              <a:ext uri="{FF2B5EF4-FFF2-40B4-BE49-F238E27FC236}">
+                <a16:creationId xmlns:a16="http://schemas.microsoft.com/office/drawing/2014/main" id="{F2629303-85DB-4937-B161-D3D0A370B6F4}"/>
+              </a:ext>
+            </a:extLst>
+          </p:cNvPr>
+          <p:cNvSpPr>
+            <a:spLocks noGrp="1"/>
+          </p:cNvSpPr>
+          <p:nvPr>
+            <p:ph type="title"/>
+          </p:nvPr>
+        </p:nvSpPr>
+        <p:spPr/>
+        <p:txBody>
+          <a:bodyPr/>
+          <a:lstStyle/>
+          <a:p>
+            <a:r>
+              <a:rPr lang="en-US" dirty="0"/>
+              <a:t>Spring Boot</a:t>
+            </a:r>
+          </a:p>
+        </p:txBody>
+      </p:sp>
+      <p:sp>
+        <p:nvSpPr>
+          <p:cNvPr id="3" name="Content Placeholder 2">
+            <a:extLst>
+              <a:ext uri="{FF2B5EF4-FFF2-40B4-BE49-F238E27FC236}">
+                <a16:creationId xmlns:a16="http://schemas.microsoft.com/office/drawing/2014/main" id="{5F0D7F9F-01D7-4DDC-927A-7072BCADE3D8}"/>
+              </a:ext>
+            </a:extLst>
+          </p:cNvPr>
+          <p:cNvSpPr>
+            <a:spLocks noGrp="1"/>
+          </p:cNvSpPr>
+          <p:nvPr>
+            <p:ph idx="1"/>
+          </p:nvPr>
+        </p:nvSpPr>
+        <p:spPr/>
+        <p:txBody>
+          <a:bodyPr/>
+          <a:lstStyle/>
+          <a:p>
+            <a:endParaRPr lang="en-US" dirty="0"/>
+          </a:p>
+        </p:txBody>
+      </p:sp>
+    </p:spTree>
+    <p:extLst>
+      <p:ext uri="{BB962C8B-B14F-4D97-AF65-F5344CB8AC3E}">
+        <p14:creationId xmlns:p14="http://schemas.microsoft.com/office/powerpoint/2010/main" val="1200986383"/>
+      </p:ext>
+    </p:extLst>
+  </p:cSld>
+  <p:clrMapOvr>
+    <a:masterClrMapping/>
+  </p:clrMapOvr>
+</p:sld>
+</file>
+
+<file path=ppt/slides/slide3.xml><?xml version="1.0" encoding="utf-8"?>
+<p:sld xmlns:a="http://schemas.openxmlformats.org/drawingml/2006/main" xmlns:r="http://schemas.openxmlformats.org/officeDocument/2006/relationships" xmlns:p="http://schemas.openxmlformats.org/presentationml/2006/main">
+  <p:cSld>
+    <p:spTree>
+      <p:nvGrpSpPr>
+        <p:cNvPr id="1" name=""/>
+        <p:cNvGrpSpPr/>
+        <p:nvPr/>
+      </p:nvGrpSpPr>
+      <p:grpSpPr>
+        <a:xfrm>
+          <a:off x="0" y="0"/>
+          <a:ext cx="0" cy="0"/>
+          <a:chOff x="0" y="0"/>
+          <a:chExt cx="0" cy="0"/>
+        </a:xfrm>
+      </p:grpSpPr>
+      <p:sp>
+        <p:nvSpPr>
+          <p:cNvPr id="2" name="Title 1">
+            <a:extLst>
+              <a:ext uri="{FF2B5EF4-FFF2-40B4-BE49-F238E27FC236}">
+                <a16:creationId xmlns:a16="http://schemas.microsoft.com/office/drawing/2014/main" id="{CB939AEC-6CEE-446F-9D1A-1A1963C88EB4}"/>
+              </a:ext>
+            </a:extLst>
+          </p:cNvPr>
+          <p:cNvSpPr>
+            <a:spLocks noGrp="1"/>
+          </p:cNvSpPr>
+          <p:nvPr>
+            <p:ph type="title"/>
+          </p:nvPr>
+        </p:nvSpPr>
+        <p:spPr/>
+        <p:txBody>
+          <a:bodyPr/>
+          <a:lstStyle/>
+          <a:p>
+            <a:r>
+              <a:rPr lang="en-US" dirty="0"/>
+              <a:t>Controller/Service/Repository</a:t>
+            </a:r>
+          </a:p>
+        </p:txBody>
+      </p:sp>
+      <p:sp>
+        <p:nvSpPr>
+          <p:cNvPr id="3" name="Content Placeholder 2">
+            <a:extLst>
+              <a:ext uri="{FF2B5EF4-FFF2-40B4-BE49-F238E27FC236}">
+                <a16:creationId xmlns:a16="http://schemas.microsoft.com/office/drawing/2014/main" id="{1BB4E9D8-9442-43DD-8F0B-EDBC194697E3}"/>
+              </a:ext>
+            </a:extLst>
+          </p:cNvPr>
+          <p:cNvSpPr>
+            <a:spLocks noGrp="1"/>
+          </p:cNvSpPr>
+          <p:nvPr>
+            <p:ph idx="1"/>
+          </p:nvPr>
+        </p:nvSpPr>
+        <p:spPr/>
+        <p:txBody>
+          <a:bodyPr>
+            <a:normAutofit fontScale="62500" lnSpcReduction="20000"/>
+          </a:bodyPr>
+          <a:lstStyle/>
+          <a:p>
+            <a:r>
+              <a:rPr lang="en-US" dirty="0" err="1"/>
+              <a:t>myview</a:t>
+            </a:r>
+            <a:r>
+              <a:rPr lang="en-US" dirty="0"/>
+              <a:t> &lt;-&gt; </a:t>
+            </a:r>
+            <a:r>
+              <a:rPr lang="en-US" dirty="0" err="1"/>
+              <a:t>MyController</a:t>
+            </a:r>
+            <a:r>
+              <a:rPr lang="en-US" dirty="0"/>
+              <a:t> &lt;- </a:t>
+            </a:r>
+            <a:r>
+              <a:rPr lang="en-US" dirty="0" err="1"/>
+              <a:t>MyService</a:t>
+            </a:r>
+            <a:r>
+              <a:rPr lang="en-US" dirty="0"/>
+              <a:t> &lt;- </a:t>
+            </a:r>
+            <a:r>
+              <a:rPr lang="en-US" dirty="0" err="1"/>
+              <a:t>MyDAO</a:t>
+            </a:r>
+            <a:endParaRPr lang="en-US" dirty="0"/>
+          </a:p>
+          <a:p>
+            <a:r>
+              <a:rPr lang="en-US" dirty="0"/>
+              <a:t>                 ^</a:t>
+            </a:r>
+          </a:p>
+          <a:p>
+            <a:r>
+              <a:rPr lang="en-US" dirty="0"/>
+              <a:t>                 |</a:t>
+            </a:r>
+          </a:p>
+          <a:p>
+            <a:r>
+              <a:rPr lang="en-US" dirty="0"/>
+              <a:t>               </a:t>
+            </a:r>
+            <a:r>
+              <a:rPr lang="en-US" dirty="0" err="1"/>
+              <a:t>MyHelper</a:t>
+            </a:r>
+            <a:endParaRPr lang="en-US" dirty="0"/>
+          </a:p>
+          <a:p>
+            <a:r>
+              <a:rPr lang="en-US" dirty="0"/>
+              <a:t>Controllers handled the view resolving.</a:t>
+            </a:r>
+          </a:p>
+          <a:p>
+            <a:r>
+              <a:rPr lang="en-US" dirty="0"/>
+              <a:t>Services handled mapping from </a:t>
+            </a:r>
+            <a:r>
+              <a:rPr lang="en-US" dirty="0" err="1"/>
+              <a:t>dto</a:t>
+            </a:r>
+            <a:r>
+              <a:rPr lang="en-US" dirty="0"/>
+              <a:t>-s to model objects for view and vice versa,</a:t>
+            </a:r>
+          </a:p>
+          <a:p>
+            <a:r>
+              <a:rPr lang="en-US" dirty="0"/>
+              <a:t>DAO-s handled database transactions and,</a:t>
+            </a:r>
+          </a:p>
+          <a:p>
+            <a:r>
+              <a:rPr lang="en-US" dirty="0"/>
+              <a:t>Helpers handled everything else including validation.</a:t>
+            </a:r>
+          </a:p>
+          <a:p>
+            <a:endParaRPr lang="en-US" dirty="0"/>
+          </a:p>
+          <a:p>
+            <a:r>
+              <a:rPr lang="en-US" dirty="0"/>
+              <a:t>Service layer provides code modularity, the business logic and rules are specified in the service layer which in turn calls DAO layer ,the DAO layer is then only responsible for interacting with DB.</a:t>
+            </a:r>
+          </a:p>
+          <a:p>
+            <a:r>
+              <a:rPr lang="en-US" dirty="0"/>
+              <a:t>you get to make a clear distinction between web type activity best done in the controller and generic business logic that is not web-related. You can test service-related business logic separately from controller logic</a:t>
+            </a:r>
+          </a:p>
+          <a:p>
+            <a:r>
+              <a:rPr lang="en-US" dirty="0"/>
+              <a:t>you get to specify transaction behavior so if you have calls to multiple data access objects you can specify that they occur within the same transaction</a:t>
+            </a:r>
+          </a:p>
+          <a:p>
+            <a:r>
+              <a:rPr lang="en-US" dirty="0"/>
+              <a:t>Repository encapsulates the details of the persistence layer and provide a CRUD interface for a single entity.</a:t>
+            </a:r>
+          </a:p>
+          <a:p>
+            <a:endParaRPr lang="en-US" dirty="0"/>
+          </a:p>
+        </p:txBody>
+      </p:sp>
+      <p:sp>
+        <p:nvSpPr>
+          <p:cNvPr id="5" name="TextBox 4">
+            <a:extLst>
+              <a:ext uri="{FF2B5EF4-FFF2-40B4-BE49-F238E27FC236}">
+                <a16:creationId xmlns:a16="http://schemas.microsoft.com/office/drawing/2014/main" id="{A6F31E81-9612-4FE0-BE57-03249B0C24C3}"/>
+              </a:ext>
+            </a:extLst>
+          </p:cNvPr>
+          <p:cNvSpPr txBox="1"/>
+          <p:nvPr/>
+        </p:nvSpPr>
+        <p:spPr>
+          <a:xfrm>
+            <a:off x="952412" y="5920712"/>
+            <a:ext cx="7207422" cy="1169551"/>
+          </a:xfrm>
+          <a:prstGeom prst="rect">
+            <a:avLst/>
+          </a:prstGeom>
+          <a:noFill/>
+        </p:spPr>
+        <p:txBody>
+          <a:bodyPr wrap="square" rtlCol="0">
+            <a:spAutoFit/>
+          </a:bodyPr>
+          <a:lstStyle/>
+          <a:p>
+            <a:r>
+              <a:rPr lang="en-US" sz="700" dirty="0"/>
+              <a:t>Business Rules</a:t>
+            </a:r>
+          </a:p>
+          <a:p>
+            <a:r>
+              <a:rPr lang="en-US" sz="700" dirty="0"/>
+              <a:t>Business rules are an important part of the business domain. </a:t>
+            </a:r>
+          </a:p>
+          <a:p>
+            <a:r>
+              <a:rPr lang="en-US" sz="700" dirty="0"/>
+              <a:t>They define data validation and other constraints that need </a:t>
+            </a:r>
+          </a:p>
+          <a:p>
+            <a:r>
+              <a:rPr lang="en-US" sz="700" dirty="0"/>
+              <a:t>to be applied on domain objects in specific business process </a:t>
+            </a:r>
+          </a:p>
+          <a:p>
+            <a:r>
+              <a:rPr lang="en-US" sz="700" dirty="0"/>
+              <a:t>scenarios. Business rules typically fall into the following categories:</a:t>
+            </a:r>
+          </a:p>
+          <a:p>
+            <a:pPr marL="285750" indent="-285750">
+              <a:buFont typeface="Arial" panose="020B0604020202020204" pitchFamily="34" charset="0"/>
+              <a:buChar char="•"/>
+            </a:pPr>
+            <a:r>
+              <a:rPr lang="en-US" sz="700" dirty="0"/>
+              <a:t>Data validation</a:t>
+            </a:r>
+          </a:p>
+          <a:p>
+            <a:pPr marL="285750" indent="-285750">
+              <a:buFont typeface="Arial" panose="020B0604020202020204" pitchFamily="34" charset="0"/>
+              <a:buChar char="•"/>
+            </a:pPr>
+            <a:r>
+              <a:rPr lang="en-US" sz="700" dirty="0"/>
+              <a:t>Data transformation</a:t>
+            </a:r>
+          </a:p>
+          <a:p>
+            <a:pPr marL="285750" indent="-285750">
+              <a:buFont typeface="Arial" panose="020B0604020202020204" pitchFamily="34" charset="0"/>
+              <a:buChar char="•"/>
+            </a:pPr>
+            <a:r>
+              <a:rPr lang="en-US" sz="700" dirty="0"/>
+              <a:t>Business decision-making</a:t>
+            </a:r>
+          </a:p>
+          <a:p>
+            <a:pPr marL="285750" indent="-285750">
+              <a:buFont typeface="Arial" panose="020B0604020202020204" pitchFamily="34" charset="0"/>
+              <a:buChar char="•"/>
+            </a:pPr>
+            <a:r>
+              <a:rPr lang="en-US" sz="700" dirty="0"/>
+              <a:t>Process routing (work-flow logic)</a:t>
+            </a:r>
+          </a:p>
+          <a:p>
+            <a:endParaRPr lang="en-US" sz="700" dirty="0"/>
+          </a:p>
+        </p:txBody>
+      </p:sp>
+    </p:spTree>
+    <p:extLst>
+      <p:ext uri="{BB962C8B-B14F-4D97-AF65-F5344CB8AC3E}">
+        <p14:creationId xmlns:p14="http://schemas.microsoft.com/office/powerpoint/2010/main" val="2893478696"/>
+      </p:ext>
+    </p:extLst>
+  </p:cSld>
+  <p:clrMapOvr>
+    <a:masterClrMapping/>
+  </p:clrMapOvr>
+</p:sld>
+</file>
+
+<file path=ppt/slides/slide4.xml><?xml version="1.0" encoding="utf-8"?>
 <p:sld xmlns:a="http://schemas.openxmlformats.org/drawingml/2006/main" xmlns:r="http://schemas.openxmlformats.org/officeDocument/2006/relationships" xmlns:p="http://schemas.openxmlformats.org/presentationml/2006/main">
   <p:cSld>
     <p:spTree>
@@ -6202,2471 +6581,6 @@
     <p:extLst>
       <p:ext uri="{BB962C8B-B14F-4D97-AF65-F5344CB8AC3E}">
         <p14:creationId xmlns:p14="http://schemas.microsoft.com/office/powerpoint/2010/main" val="1134989389"/>
-      </p:ext>
-    </p:extLst>
-  </p:cSld>
-  <p:clrMapOvr>
-    <a:masterClrMapping/>
-  </p:clrMapOvr>
-</p:sld>
-</file>
-
-<file path=ppt/slides/slide2.xml><?xml version="1.0" encoding="utf-8"?>
-<p:sld xmlns:a="http://schemas.openxmlformats.org/drawingml/2006/main" xmlns:r="http://schemas.openxmlformats.org/officeDocument/2006/relationships" xmlns:p="http://schemas.openxmlformats.org/presentationml/2006/main">
-  <p:cSld>
-    <p:spTree>
-      <p:nvGrpSpPr>
-        <p:cNvPr id="1" name=""/>
-        <p:cNvGrpSpPr/>
-        <p:nvPr/>
-      </p:nvGrpSpPr>
-      <p:grpSpPr>
-        <a:xfrm>
-          <a:off x="0" y="0"/>
-          <a:ext cx="0" cy="0"/>
-          <a:chOff x="0" y="0"/>
-          <a:chExt cx="0" cy="0"/>
-        </a:xfrm>
-      </p:grpSpPr>
-      <p:sp>
-        <p:nvSpPr>
-          <p:cNvPr id="15" name="Cube 14">
-            <a:extLst>
-              <a:ext uri="{FF2B5EF4-FFF2-40B4-BE49-F238E27FC236}">
-                <a16:creationId xmlns:a16="http://schemas.microsoft.com/office/drawing/2014/main" id="{E479A928-3235-4959-B294-8EC09E53D51A}"/>
-              </a:ext>
-            </a:extLst>
-          </p:cNvPr>
-          <p:cNvSpPr/>
-          <p:nvPr/>
-        </p:nvSpPr>
-        <p:spPr>
-          <a:xfrm>
-            <a:off x="841905" y="1530670"/>
-            <a:ext cx="3540330" cy="2996645"/>
-          </a:xfrm>
-          <a:prstGeom prst="cube">
-            <a:avLst>
-              <a:gd name="adj" fmla="val 3619"/>
-            </a:avLst>
-          </a:prstGeom>
-        </p:spPr>
-        <p:style>
-          <a:lnRef idx="1">
-            <a:schemeClr val="dk1"/>
-          </a:lnRef>
-          <a:fillRef idx="2">
-            <a:schemeClr val="dk1"/>
-          </a:fillRef>
-          <a:effectRef idx="1">
-            <a:schemeClr val="dk1"/>
-          </a:effectRef>
-          <a:fontRef idx="minor">
-            <a:schemeClr val="dk1"/>
-          </a:fontRef>
-        </p:style>
-        <p:txBody>
-          <a:bodyPr rtlCol="0" anchor="ctr"/>
-          <a:lstStyle/>
-          <a:p>
-            <a:pPr algn="ctr"/>
-            <a:r>
-              <a:rPr lang="en-US" dirty="0"/>
-              <a:t>Application Server</a:t>
-            </a:r>
-          </a:p>
-          <a:p>
-            <a:pPr algn="ctr"/>
-            <a:endParaRPr lang="en-US" dirty="0"/>
-          </a:p>
-          <a:p>
-            <a:pPr algn="ctr"/>
-            <a:endParaRPr lang="en-US" dirty="0"/>
-          </a:p>
-          <a:p>
-            <a:pPr algn="ctr"/>
-            <a:endParaRPr lang="en-US" dirty="0"/>
-          </a:p>
-          <a:p>
-            <a:pPr algn="ctr"/>
-            <a:endParaRPr lang="en-US" dirty="0"/>
-          </a:p>
-          <a:p>
-            <a:pPr algn="ctr"/>
-            <a:endParaRPr lang="en-US" dirty="0"/>
-          </a:p>
-          <a:p>
-            <a:pPr algn="ctr"/>
-            <a:endParaRPr lang="en-US" dirty="0"/>
-          </a:p>
-          <a:p>
-            <a:pPr algn="ctr"/>
-            <a:endParaRPr lang="en-US" dirty="0"/>
-          </a:p>
-          <a:p>
-            <a:pPr algn="ctr"/>
-            <a:endParaRPr lang="en-US" dirty="0"/>
-          </a:p>
-          <a:p>
-            <a:pPr algn="ctr"/>
-            <a:endParaRPr lang="en-US" dirty="0"/>
-          </a:p>
-        </p:txBody>
-      </p:sp>
-      <p:sp>
-        <p:nvSpPr>
-          <p:cNvPr id="2" name="Title 1">
-            <a:extLst>
-              <a:ext uri="{FF2B5EF4-FFF2-40B4-BE49-F238E27FC236}">
-                <a16:creationId xmlns:a16="http://schemas.microsoft.com/office/drawing/2014/main" id="{90795282-835C-48C3-96C5-876A8FE6C076}"/>
-              </a:ext>
-            </a:extLst>
-          </p:cNvPr>
-          <p:cNvSpPr>
-            <a:spLocks noGrp="1"/>
-          </p:cNvSpPr>
-          <p:nvPr>
-            <p:ph type="title"/>
-          </p:nvPr>
-        </p:nvSpPr>
-        <p:spPr/>
-        <p:txBody>
-          <a:bodyPr/>
-          <a:lstStyle/>
-          <a:p>
-            <a:r>
-              <a:rPr lang="en-US" dirty="0"/>
-              <a:t>Monolithic Architecture Benefits</a:t>
-            </a:r>
-          </a:p>
-        </p:txBody>
-      </p:sp>
-      <p:sp>
-        <p:nvSpPr>
-          <p:cNvPr id="7" name="Content Placeholder 6">
-            <a:extLst>
-              <a:ext uri="{FF2B5EF4-FFF2-40B4-BE49-F238E27FC236}">
-                <a16:creationId xmlns:a16="http://schemas.microsoft.com/office/drawing/2014/main" id="{1F883B35-2988-4BB2-990D-F42B9BE1B217}"/>
-              </a:ext>
-            </a:extLst>
-          </p:cNvPr>
-          <p:cNvSpPr>
-            <a:spLocks noGrp="1"/>
-          </p:cNvSpPr>
-          <p:nvPr>
-            <p:ph idx="1"/>
-          </p:nvPr>
-        </p:nvSpPr>
-        <p:spPr>
-          <a:xfrm>
-            <a:off x="4546807" y="1530671"/>
-            <a:ext cx="6024778" cy="4385036"/>
-          </a:xfrm>
-        </p:spPr>
-        <p:txBody>
-          <a:bodyPr>
-            <a:normAutofit/>
-          </a:bodyPr>
-          <a:lstStyle/>
-          <a:p>
-            <a:r>
-              <a:rPr lang="en-US" dirty="0"/>
-              <a:t>Well known “classic” architecture approach</a:t>
-            </a:r>
-          </a:p>
-          <a:p>
-            <a:pPr lvl="1"/>
-            <a:r>
-              <a:rPr lang="en-US" dirty="0"/>
-              <a:t>Easy to design</a:t>
-            </a:r>
-          </a:p>
-          <a:p>
-            <a:pPr lvl="1"/>
-            <a:r>
-              <a:rPr lang="en-US" dirty="0"/>
-              <a:t>Easy to understand</a:t>
-            </a:r>
-          </a:p>
-          <a:p>
-            <a:pPr lvl="1"/>
-            <a:r>
-              <a:rPr lang="en-US" dirty="0"/>
-              <a:t>Easy to debug</a:t>
-            </a:r>
-          </a:p>
-          <a:p>
-            <a:pPr lvl="1"/>
-            <a:r>
-              <a:rPr lang="en-US" dirty="0"/>
-              <a:t>Easy to deploy</a:t>
-            </a:r>
-          </a:p>
-          <a:p>
-            <a:pPr lvl="1"/>
-            <a:r>
-              <a:rPr lang="en-US" dirty="0"/>
-              <a:t>Easy to scale</a:t>
-            </a:r>
-          </a:p>
-          <a:p>
-            <a:pPr lvl="1"/>
-            <a:r>
-              <a:rPr lang="en-US" dirty="0"/>
-              <a:t>Easy to maintain</a:t>
-            </a:r>
-          </a:p>
-          <a:p>
-            <a:r>
-              <a:rPr lang="en-US" dirty="0"/>
-              <a:t>Good to start new Proof of Concept projects</a:t>
-            </a:r>
-          </a:p>
-          <a:p>
-            <a:r>
-              <a:rPr lang="en-US" dirty="0"/>
-              <a:t>Good for small-to-mid size applications)</a:t>
-            </a:r>
-          </a:p>
-          <a:p>
-            <a:r>
-              <a:rPr lang="en-US" dirty="0"/>
-              <a:t>Good for single development team</a:t>
-            </a:r>
-          </a:p>
-          <a:p>
-            <a:endParaRPr lang="en-US" dirty="0"/>
-          </a:p>
-          <a:p>
-            <a:endParaRPr lang="en-US" dirty="0"/>
-          </a:p>
-        </p:txBody>
-      </p:sp>
-      <p:sp>
-        <p:nvSpPr>
-          <p:cNvPr id="5" name="Flowchart: Magnetic Disk 4">
-            <a:extLst>
-              <a:ext uri="{FF2B5EF4-FFF2-40B4-BE49-F238E27FC236}">
-                <a16:creationId xmlns:a16="http://schemas.microsoft.com/office/drawing/2014/main" id="{623A1A54-B2BE-41D3-A55B-1E57A21E3647}"/>
-              </a:ext>
-            </a:extLst>
-          </p:cNvPr>
-          <p:cNvSpPr/>
-          <p:nvPr/>
-        </p:nvSpPr>
-        <p:spPr>
-          <a:xfrm>
-            <a:off x="1431973" y="4645974"/>
-            <a:ext cx="2290942" cy="1269732"/>
-          </a:xfrm>
-          <a:prstGeom prst="flowChartMagneticDisk">
-            <a:avLst/>
-          </a:prstGeom>
-          <a:solidFill>
-            <a:srgbClr val="E3D14B"/>
-          </a:solidFill>
-        </p:spPr>
-        <p:style>
-          <a:lnRef idx="2">
-            <a:schemeClr val="dk1"/>
-          </a:lnRef>
-          <a:fillRef idx="1">
-            <a:schemeClr val="lt1"/>
-          </a:fillRef>
-          <a:effectRef idx="0">
-            <a:schemeClr val="dk1"/>
-          </a:effectRef>
-          <a:fontRef idx="minor">
-            <a:schemeClr val="dk1"/>
-          </a:fontRef>
-        </p:style>
-        <p:txBody>
-          <a:bodyPr rtlCol="0" anchor="ctr"/>
-          <a:lstStyle/>
-          <a:p>
-            <a:pPr algn="ctr"/>
-            <a:r>
-              <a:rPr lang="en-US" dirty="0"/>
-              <a:t>Relational</a:t>
-            </a:r>
-          </a:p>
-          <a:p>
-            <a:pPr algn="ctr"/>
-            <a:r>
-              <a:rPr lang="en-US" dirty="0"/>
-              <a:t>DB</a:t>
-            </a:r>
-          </a:p>
-        </p:txBody>
-      </p:sp>
-      <p:sp>
-        <p:nvSpPr>
-          <p:cNvPr id="6" name="Cube 5">
-            <a:extLst>
-              <a:ext uri="{FF2B5EF4-FFF2-40B4-BE49-F238E27FC236}">
-                <a16:creationId xmlns:a16="http://schemas.microsoft.com/office/drawing/2014/main" id="{C375F6A3-91D3-48D9-836A-7FA6CB10488C}"/>
-              </a:ext>
-            </a:extLst>
-          </p:cNvPr>
-          <p:cNvSpPr/>
-          <p:nvPr/>
-        </p:nvSpPr>
-        <p:spPr>
-          <a:xfrm>
-            <a:off x="1031629" y="3318791"/>
-            <a:ext cx="2915489" cy="1023101"/>
-          </a:xfrm>
-          <a:prstGeom prst="cube">
-            <a:avLst>
-              <a:gd name="adj" fmla="val 51041"/>
-            </a:avLst>
-          </a:prstGeom>
-        </p:spPr>
-        <p:style>
-          <a:lnRef idx="0">
-            <a:schemeClr val="accent2"/>
-          </a:lnRef>
-          <a:fillRef idx="3">
-            <a:schemeClr val="accent2"/>
-          </a:fillRef>
-          <a:effectRef idx="3">
-            <a:schemeClr val="accent2"/>
-          </a:effectRef>
-          <a:fontRef idx="minor">
-            <a:schemeClr val="lt1"/>
-          </a:fontRef>
-        </p:style>
-        <p:txBody>
-          <a:bodyPr rtlCol="0" anchor="ctr"/>
-          <a:lstStyle/>
-          <a:p>
-            <a:pPr algn="ctr"/>
-            <a:r>
-              <a:rPr lang="en-US" dirty="0"/>
-              <a:t>Data/ORM</a:t>
-            </a:r>
-          </a:p>
-        </p:txBody>
-      </p:sp>
-      <p:sp>
-        <p:nvSpPr>
-          <p:cNvPr id="12" name="Cube 11">
-            <a:extLst>
-              <a:ext uri="{FF2B5EF4-FFF2-40B4-BE49-F238E27FC236}">
-                <a16:creationId xmlns:a16="http://schemas.microsoft.com/office/drawing/2014/main" id="{6065278A-DCA6-458D-B6A8-EE3098B8F0FE}"/>
-              </a:ext>
-            </a:extLst>
-          </p:cNvPr>
-          <p:cNvSpPr/>
-          <p:nvPr/>
-        </p:nvSpPr>
-        <p:spPr>
-          <a:xfrm>
-            <a:off x="1031631" y="2708774"/>
-            <a:ext cx="2915489" cy="1023101"/>
-          </a:xfrm>
-          <a:prstGeom prst="cube">
-            <a:avLst>
-              <a:gd name="adj" fmla="val 51041"/>
-            </a:avLst>
-          </a:prstGeom>
-        </p:spPr>
-        <p:style>
-          <a:lnRef idx="1">
-            <a:schemeClr val="accent4"/>
-          </a:lnRef>
-          <a:fillRef idx="2">
-            <a:schemeClr val="accent4"/>
-          </a:fillRef>
-          <a:effectRef idx="1">
-            <a:schemeClr val="accent4"/>
-          </a:effectRef>
-          <a:fontRef idx="minor">
-            <a:schemeClr val="dk1"/>
-          </a:fontRef>
-        </p:style>
-        <p:txBody>
-          <a:bodyPr rtlCol="0" anchor="ctr"/>
-          <a:lstStyle/>
-          <a:p>
-            <a:pPr algn="ctr"/>
-            <a:r>
-              <a:rPr lang="en-US" dirty="0">
-                <a:solidFill>
-                  <a:schemeClr val="bg1"/>
-                </a:solidFill>
-              </a:rPr>
-              <a:t>Business Logic</a:t>
-            </a:r>
-          </a:p>
-        </p:txBody>
-      </p:sp>
-      <p:sp>
-        <p:nvSpPr>
-          <p:cNvPr id="13" name="Cube 12">
-            <a:extLst>
-              <a:ext uri="{FF2B5EF4-FFF2-40B4-BE49-F238E27FC236}">
-                <a16:creationId xmlns:a16="http://schemas.microsoft.com/office/drawing/2014/main" id="{92B760D5-2DD7-44DE-B89F-C2C01746F524}"/>
-              </a:ext>
-            </a:extLst>
-          </p:cNvPr>
-          <p:cNvSpPr/>
-          <p:nvPr/>
-        </p:nvSpPr>
-        <p:spPr>
-          <a:xfrm>
-            <a:off x="1031631" y="2090662"/>
-            <a:ext cx="2915488" cy="1023101"/>
-          </a:xfrm>
-          <a:prstGeom prst="cube">
-            <a:avLst>
-              <a:gd name="adj" fmla="val 51041"/>
-            </a:avLst>
-          </a:prstGeom>
-        </p:spPr>
-        <p:style>
-          <a:lnRef idx="2">
-            <a:schemeClr val="accent1">
-              <a:shade val="50000"/>
-            </a:schemeClr>
-          </a:lnRef>
-          <a:fillRef idx="1">
-            <a:schemeClr val="accent1"/>
-          </a:fillRef>
-          <a:effectRef idx="0">
-            <a:schemeClr val="accent1"/>
-          </a:effectRef>
-          <a:fontRef idx="minor">
-            <a:schemeClr val="lt1"/>
-          </a:fontRef>
-        </p:style>
-        <p:txBody>
-          <a:bodyPr rtlCol="0" anchor="ctr"/>
-          <a:lstStyle/>
-          <a:p>
-            <a:pPr algn="ctr"/>
-            <a:r>
-              <a:rPr lang="en-US" dirty="0"/>
-              <a:t>User Interface</a:t>
-            </a:r>
-          </a:p>
-        </p:txBody>
-      </p:sp>
-      <p:sp>
-        <p:nvSpPr>
-          <p:cNvPr id="14" name="Arrow: Up-Down 13">
-            <a:extLst>
-              <a:ext uri="{FF2B5EF4-FFF2-40B4-BE49-F238E27FC236}">
-                <a16:creationId xmlns:a16="http://schemas.microsoft.com/office/drawing/2014/main" id="{93F65D31-79D0-4AD0-8A74-90B02D75D34D}"/>
-              </a:ext>
-            </a:extLst>
-          </p:cNvPr>
-          <p:cNvSpPr/>
-          <p:nvPr/>
-        </p:nvSpPr>
-        <p:spPr>
-          <a:xfrm>
-            <a:off x="2374461" y="4349987"/>
-            <a:ext cx="347089" cy="568135"/>
-          </a:xfrm>
-          <a:prstGeom prst="upDownArrow">
-            <a:avLst/>
-          </a:prstGeom>
-        </p:spPr>
-        <p:style>
-          <a:lnRef idx="1">
-            <a:schemeClr val="dk1"/>
-          </a:lnRef>
-          <a:fillRef idx="2">
-            <a:schemeClr val="dk1"/>
-          </a:fillRef>
-          <a:effectRef idx="1">
-            <a:schemeClr val="dk1"/>
-          </a:effectRef>
-          <a:fontRef idx="minor">
-            <a:schemeClr val="dk1"/>
-          </a:fontRef>
-        </p:style>
-        <p:txBody>
-          <a:bodyPr rtlCol="0" anchor="ctr"/>
-          <a:lstStyle/>
-          <a:p>
-            <a:pPr algn="ctr"/>
-            <a:endParaRPr lang="en-US" dirty="0"/>
-          </a:p>
-        </p:txBody>
-      </p:sp>
-    </p:spTree>
-    <p:extLst>
-      <p:ext uri="{BB962C8B-B14F-4D97-AF65-F5344CB8AC3E}">
-        <p14:creationId xmlns:p14="http://schemas.microsoft.com/office/powerpoint/2010/main" val="2519797555"/>
-      </p:ext>
-    </p:extLst>
-  </p:cSld>
-  <p:clrMapOvr>
-    <a:masterClrMapping/>
-  </p:clrMapOvr>
-</p:sld>
-</file>
-
-<file path=ppt/slides/slide3.xml><?xml version="1.0" encoding="utf-8"?>
-<p:sld xmlns:a="http://schemas.openxmlformats.org/drawingml/2006/main" xmlns:r="http://schemas.openxmlformats.org/officeDocument/2006/relationships" xmlns:p="http://schemas.openxmlformats.org/presentationml/2006/main">
-  <p:cSld>
-    <p:spTree>
-      <p:nvGrpSpPr>
-        <p:cNvPr id="1" name=""/>
-        <p:cNvGrpSpPr/>
-        <p:nvPr/>
-      </p:nvGrpSpPr>
-      <p:grpSpPr>
-        <a:xfrm>
-          <a:off x="0" y="0"/>
-          <a:ext cx="0" cy="0"/>
-          <a:chOff x="0" y="0"/>
-          <a:chExt cx="0" cy="0"/>
-        </a:xfrm>
-      </p:grpSpPr>
-      <p:sp>
-        <p:nvSpPr>
-          <p:cNvPr id="2" name="Title 1">
-            <a:extLst>
-              <a:ext uri="{FF2B5EF4-FFF2-40B4-BE49-F238E27FC236}">
-                <a16:creationId xmlns:a16="http://schemas.microsoft.com/office/drawing/2014/main" id="{90795282-835C-48C3-96C5-876A8FE6C076}"/>
-              </a:ext>
-            </a:extLst>
-          </p:cNvPr>
-          <p:cNvSpPr>
-            <a:spLocks noGrp="1"/>
-          </p:cNvSpPr>
-          <p:nvPr>
-            <p:ph type="title"/>
-          </p:nvPr>
-        </p:nvSpPr>
-        <p:spPr/>
-        <p:txBody>
-          <a:bodyPr/>
-          <a:lstStyle/>
-          <a:p>
-            <a:r>
-              <a:rPr lang="en-US" dirty="0"/>
-              <a:t>Monolithic Architecture Drawbacks</a:t>
-            </a:r>
-          </a:p>
-        </p:txBody>
-      </p:sp>
-      <p:sp>
-        <p:nvSpPr>
-          <p:cNvPr id="7" name="Content Placeholder 6">
-            <a:extLst>
-              <a:ext uri="{FF2B5EF4-FFF2-40B4-BE49-F238E27FC236}">
-                <a16:creationId xmlns:a16="http://schemas.microsoft.com/office/drawing/2014/main" id="{1F883B35-2988-4BB2-990D-F42B9BE1B217}"/>
-              </a:ext>
-            </a:extLst>
-          </p:cNvPr>
-          <p:cNvSpPr>
-            <a:spLocks noGrp="1"/>
-          </p:cNvSpPr>
-          <p:nvPr>
-            <p:ph idx="1"/>
-          </p:nvPr>
-        </p:nvSpPr>
-        <p:spPr>
-          <a:xfrm>
-            <a:off x="4215900" y="1344007"/>
-            <a:ext cx="5614231" cy="4904393"/>
-          </a:xfrm>
-        </p:spPr>
-        <p:txBody>
-          <a:bodyPr>
-            <a:normAutofit fontScale="85000" lnSpcReduction="20000"/>
-          </a:bodyPr>
-          <a:lstStyle/>
-          <a:p>
-            <a:r>
-              <a:rPr lang="en-US" dirty="0"/>
-              <a:t>The large monolithic code base can be difficult to understand and modify because of complex dependencies</a:t>
-            </a:r>
-          </a:p>
-          <a:p>
-            <a:r>
-              <a:rPr lang="en-US" dirty="0"/>
-              <a:t>Large code base slows down the IDE</a:t>
-            </a:r>
-          </a:p>
-          <a:p>
-            <a:r>
-              <a:rPr lang="en-US" dirty="0"/>
-              <a:t>Large applications start and work slowly. </a:t>
-            </a:r>
-          </a:p>
-          <a:p>
-            <a:r>
-              <a:rPr lang="en-US" dirty="0"/>
-              <a:t>Continuous Delivery is difficult because long build/test/deploy cycle</a:t>
-            </a:r>
-          </a:p>
-          <a:p>
-            <a:r>
-              <a:rPr lang="en-US" dirty="0"/>
-              <a:t>Because all modules are running within the same process, a bug in any module, such as a memory leak, can potentially bring down the entire process. </a:t>
-            </a:r>
-          </a:p>
-          <a:p>
-            <a:r>
-              <a:rPr lang="en-US" dirty="0"/>
-              <a:t>A monolithic architecture forces developers to be married to the technology stack which was chosen at the start of development</a:t>
-            </a:r>
-          </a:p>
-          <a:p>
-            <a:r>
-              <a:rPr lang="en-US" dirty="0"/>
-              <a:t>Development scaling requires significant coordination efforts</a:t>
-            </a:r>
-          </a:p>
-          <a:p>
-            <a:r>
-              <a:rPr lang="en-US" dirty="0"/>
-              <a:t>Vertical application scaling can be costly and not always possible because of expensive hardware.</a:t>
-            </a:r>
-          </a:p>
-          <a:p>
-            <a:r>
-              <a:rPr lang="en-US" dirty="0"/>
-              <a:t>Horizontal scaling might be difficult because of expensive high availability (HA) technologies and complex load balancing</a:t>
-            </a:r>
-          </a:p>
-          <a:p>
-            <a:r>
-              <a:rPr lang="en-US" dirty="0"/>
-              <a:t>Requires long term commitment to a technology stack</a:t>
-            </a:r>
-          </a:p>
-          <a:p>
-            <a:endParaRPr lang="en-US" dirty="0"/>
-          </a:p>
-        </p:txBody>
-      </p:sp>
-      <p:pic>
-        <p:nvPicPr>
-          <p:cNvPr id="8" name="Picture 7">
-            <a:extLst>
-              <a:ext uri="{FF2B5EF4-FFF2-40B4-BE49-F238E27FC236}">
-                <a16:creationId xmlns:a16="http://schemas.microsoft.com/office/drawing/2014/main" id="{C824E40A-EB45-41B0-9ACE-70204374AC85}"/>
-              </a:ext>
-            </a:extLst>
-          </p:cNvPr>
-          <p:cNvPicPr>
-            <a:picLocks noChangeAspect="1"/>
-          </p:cNvPicPr>
-          <p:nvPr/>
-        </p:nvPicPr>
-        <p:blipFill>
-          <a:blip r:embed="rId2"/>
-          <a:stretch>
-            <a:fillRect/>
-          </a:stretch>
-        </p:blipFill>
-        <p:spPr>
-          <a:xfrm>
-            <a:off x="472575" y="1930400"/>
-            <a:ext cx="3743325" cy="3209925"/>
-          </a:xfrm>
-          <a:prstGeom prst="rect">
-            <a:avLst/>
-          </a:prstGeom>
-        </p:spPr>
-      </p:pic>
-      <p:sp>
-        <p:nvSpPr>
-          <p:cNvPr id="9" name="Flowchart: Magnetic Disk 8">
-            <a:extLst>
-              <a:ext uri="{FF2B5EF4-FFF2-40B4-BE49-F238E27FC236}">
-                <a16:creationId xmlns:a16="http://schemas.microsoft.com/office/drawing/2014/main" id="{DBC1798B-B12E-4290-9AFA-D3223120517D}"/>
-              </a:ext>
-            </a:extLst>
-          </p:cNvPr>
-          <p:cNvSpPr/>
-          <p:nvPr/>
-        </p:nvSpPr>
-        <p:spPr>
-          <a:xfrm>
-            <a:off x="537889" y="5140325"/>
-            <a:ext cx="740405" cy="625993"/>
-          </a:xfrm>
-          <a:prstGeom prst="flowChartMagneticDisk">
-            <a:avLst/>
-          </a:prstGeom>
-          <a:solidFill>
-            <a:srgbClr val="E3D14B"/>
-          </a:solidFill>
-        </p:spPr>
-        <p:style>
-          <a:lnRef idx="2">
-            <a:schemeClr val="dk1"/>
-          </a:lnRef>
-          <a:fillRef idx="1">
-            <a:schemeClr val="lt1"/>
-          </a:fillRef>
-          <a:effectRef idx="0">
-            <a:schemeClr val="dk1"/>
-          </a:effectRef>
-          <a:fontRef idx="minor">
-            <a:schemeClr val="dk1"/>
-          </a:fontRef>
-        </p:style>
-        <p:txBody>
-          <a:bodyPr rtlCol="0" anchor="ctr"/>
-          <a:lstStyle/>
-          <a:p>
-            <a:pPr algn="ctr"/>
-            <a:endParaRPr lang="en-US" dirty="0"/>
-          </a:p>
-        </p:txBody>
-      </p:sp>
-      <p:sp>
-        <p:nvSpPr>
-          <p:cNvPr id="11" name="Flowchart: Magnetic Disk 10">
-            <a:extLst>
-              <a:ext uri="{FF2B5EF4-FFF2-40B4-BE49-F238E27FC236}">
-                <a16:creationId xmlns:a16="http://schemas.microsoft.com/office/drawing/2014/main" id="{BDA96DA8-3E8F-4EE6-9332-D63F2810779A}"/>
-              </a:ext>
-            </a:extLst>
-          </p:cNvPr>
-          <p:cNvSpPr/>
-          <p:nvPr/>
-        </p:nvSpPr>
-        <p:spPr>
-          <a:xfrm>
-            <a:off x="1839965" y="5140323"/>
-            <a:ext cx="740405" cy="625993"/>
-          </a:xfrm>
-          <a:prstGeom prst="flowChartMagneticDisk">
-            <a:avLst/>
-          </a:prstGeom>
-          <a:solidFill>
-            <a:srgbClr val="E3D14B"/>
-          </a:solidFill>
-        </p:spPr>
-        <p:style>
-          <a:lnRef idx="2">
-            <a:schemeClr val="dk1"/>
-          </a:lnRef>
-          <a:fillRef idx="1">
-            <a:schemeClr val="lt1"/>
-          </a:fillRef>
-          <a:effectRef idx="0">
-            <a:schemeClr val="dk1"/>
-          </a:effectRef>
-          <a:fontRef idx="minor">
-            <a:schemeClr val="dk1"/>
-          </a:fontRef>
-        </p:style>
-        <p:txBody>
-          <a:bodyPr rtlCol="0" anchor="ctr"/>
-          <a:lstStyle/>
-          <a:p>
-            <a:pPr algn="ctr"/>
-            <a:endParaRPr lang="en-US" dirty="0"/>
-          </a:p>
-        </p:txBody>
-      </p:sp>
-    </p:spTree>
-    <p:extLst>
-      <p:ext uri="{BB962C8B-B14F-4D97-AF65-F5344CB8AC3E}">
-        <p14:creationId xmlns:p14="http://schemas.microsoft.com/office/powerpoint/2010/main" val="342480179"/>
-      </p:ext>
-    </p:extLst>
-  </p:cSld>
-  <p:clrMapOvr>
-    <a:masterClrMapping/>
-  </p:clrMapOvr>
-</p:sld>
-</file>
-
-<file path=ppt/slides/slide4.xml><?xml version="1.0" encoding="utf-8"?>
-<p:sld xmlns:a="http://schemas.openxmlformats.org/drawingml/2006/main" xmlns:r="http://schemas.openxmlformats.org/officeDocument/2006/relationships" xmlns:p="http://schemas.openxmlformats.org/presentationml/2006/main">
-  <p:cSld>
-    <p:spTree>
-      <p:nvGrpSpPr>
-        <p:cNvPr id="1" name=""/>
-        <p:cNvGrpSpPr/>
-        <p:nvPr/>
-      </p:nvGrpSpPr>
-      <p:grpSpPr>
-        <a:xfrm>
-          <a:off x="0" y="0"/>
-          <a:ext cx="0" cy="0"/>
-          <a:chOff x="0" y="0"/>
-          <a:chExt cx="0" cy="0"/>
-        </a:xfrm>
-      </p:grpSpPr>
-      <p:sp>
-        <p:nvSpPr>
-          <p:cNvPr id="2" name="Title 1">
-            <a:extLst>
-              <a:ext uri="{FF2B5EF4-FFF2-40B4-BE49-F238E27FC236}">
-                <a16:creationId xmlns:a16="http://schemas.microsoft.com/office/drawing/2014/main" id="{33BE61A3-09DE-4389-B853-EFA60A2E4779}"/>
-              </a:ext>
-            </a:extLst>
-          </p:cNvPr>
-          <p:cNvSpPr>
-            <a:spLocks noGrp="1"/>
-          </p:cNvSpPr>
-          <p:nvPr>
-            <p:ph type="title"/>
-          </p:nvPr>
-        </p:nvSpPr>
-        <p:spPr/>
-        <p:txBody>
-          <a:bodyPr/>
-          <a:lstStyle/>
-          <a:p>
-            <a:r>
-              <a:rPr lang="en-US" dirty="0"/>
-              <a:t>Heavyweight Monolith Spring Stack</a:t>
-            </a:r>
-          </a:p>
-        </p:txBody>
-      </p:sp>
-      <p:pic>
-        <p:nvPicPr>
-          <p:cNvPr id="1028" name="Picture 4" descr="https://cloud.fas-consulting.de/drupal/sites/default/files/imce_uploads/news/2018-10-09%20Spring%20Component%20Technologies.png">
-            <a:extLst>
-              <a:ext uri="{FF2B5EF4-FFF2-40B4-BE49-F238E27FC236}">
-                <a16:creationId xmlns:a16="http://schemas.microsoft.com/office/drawing/2014/main" id="{9A06BA14-4600-43F0-B595-0CEBC66C67CD}"/>
-              </a:ext>
-            </a:extLst>
-          </p:cNvPr>
-          <p:cNvPicPr>
-            <a:picLocks noChangeAspect="1" noChangeArrowheads="1"/>
-          </p:cNvPicPr>
-          <p:nvPr/>
-        </p:nvPicPr>
-        <p:blipFill>
-          <a:blip r:embed="rId2">
-            <a:extLst>
-              <a:ext uri="{28A0092B-C50C-407E-A947-70E740481C1C}">
-                <a14:useLocalDpi xmlns:a14="http://schemas.microsoft.com/office/drawing/2010/main" val="0"/>
-              </a:ext>
-            </a:extLst>
-          </a:blip>
-          <a:srcRect/>
-          <a:stretch>
-            <a:fillRect/>
-          </a:stretch>
-        </p:blipFill>
-        <p:spPr bwMode="auto">
-          <a:xfrm>
-            <a:off x="674538" y="1452651"/>
-            <a:ext cx="8705850" cy="5076825"/>
-          </a:xfrm>
-          <a:prstGeom prst="rect">
-            <a:avLst/>
-          </a:prstGeom>
-          <a:noFill/>
-          <a:extLst>
-            <a:ext uri="{909E8E84-426E-40DD-AFC4-6F175D3DCCD1}">
-              <a14:hiddenFill xmlns:a14="http://schemas.microsoft.com/office/drawing/2010/main">
-                <a:solidFill>
-                  <a:srgbClr val="FFFFFF"/>
-                </a:solidFill>
-              </a14:hiddenFill>
-            </a:ext>
-          </a:extLst>
-        </p:spPr>
-      </p:pic>
-    </p:spTree>
-    <p:extLst>
-      <p:ext uri="{BB962C8B-B14F-4D97-AF65-F5344CB8AC3E}">
-        <p14:creationId xmlns:p14="http://schemas.microsoft.com/office/powerpoint/2010/main" val="3013525999"/>
-      </p:ext>
-    </p:extLst>
-  </p:cSld>
-  <p:clrMapOvr>
-    <a:masterClrMapping/>
-  </p:clrMapOvr>
-</p:sld>
-</file>
-
-<file path=ppt/slides/slide5.xml><?xml version="1.0" encoding="utf-8"?>
-<p:sld xmlns:a="http://schemas.openxmlformats.org/drawingml/2006/main" xmlns:r="http://schemas.openxmlformats.org/officeDocument/2006/relationships" xmlns:p="http://schemas.openxmlformats.org/presentationml/2006/main">
-  <p:cSld>
-    <p:spTree>
-      <p:nvGrpSpPr>
-        <p:cNvPr id="1" name=""/>
-        <p:cNvGrpSpPr/>
-        <p:nvPr/>
-      </p:nvGrpSpPr>
-      <p:grpSpPr>
-        <a:xfrm>
-          <a:off x="0" y="0"/>
-          <a:ext cx="0" cy="0"/>
-          <a:chOff x="0" y="0"/>
-          <a:chExt cx="0" cy="0"/>
-        </a:xfrm>
-      </p:grpSpPr>
-      <p:sp>
-        <p:nvSpPr>
-          <p:cNvPr id="2" name="Title 1">
-            <a:extLst>
-              <a:ext uri="{FF2B5EF4-FFF2-40B4-BE49-F238E27FC236}">
-                <a16:creationId xmlns:a16="http://schemas.microsoft.com/office/drawing/2014/main" id="{D894068E-A783-4345-B30B-3B8F7164C5FE}"/>
-              </a:ext>
-            </a:extLst>
-          </p:cNvPr>
-          <p:cNvSpPr>
-            <a:spLocks noGrp="1"/>
-          </p:cNvSpPr>
-          <p:nvPr>
-            <p:ph type="title"/>
-          </p:nvPr>
-        </p:nvSpPr>
-        <p:spPr/>
-        <p:txBody>
-          <a:bodyPr/>
-          <a:lstStyle/>
-          <a:p>
-            <a:r>
-              <a:rPr lang="en-US" dirty="0"/>
-              <a:t>Demo App Architecture</a:t>
-            </a:r>
-          </a:p>
-        </p:txBody>
-      </p:sp>
-      <p:sp>
-        <p:nvSpPr>
-          <p:cNvPr id="3" name="Content Placeholder 2">
-            <a:extLst>
-              <a:ext uri="{FF2B5EF4-FFF2-40B4-BE49-F238E27FC236}">
-                <a16:creationId xmlns:a16="http://schemas.microsoft.com/office/drawing/2014/main" id="{0FBCDAE8-027D-41C3-A7CA-3476BD67F821}"/>
-              </a:ext>
-            </a:extLst>
-          </p:cNvPr>
-          <p:cNvSpPr>
-            <a:spLocks noGrp="1"/>
-          </p:cNvSpPr>
-          <p:nvPr>
-            <p:ph idx="1"/>
-          </p:nvPr>
-        </p:nvSpPr>
-        <p:spPr/>
-        <p:txBody>
-          <a:bodyPr/>
-          <a:lstStyle/>
-          <a:p>
-            <a:endParaRPr lang="en-US" dirty="0"/>
-          </a:p>
-        </p:txBody>
-      </p:sp>
-      <p:pic>
-        <p:nvPicPr>
-          <p:cNvPr id="3078" name="Picture 6" descr="New application architecture">
-            <a:extLst>
-              <a:ext uri="{FF2B5EF4-FFF2-40B4-BE49-F238E27FC236}">
-                <a16:creationId xmlns:a16="http://schemas.microsoft.com/office/drawing/2014/main" id="{EE8BBBBC-D146-4A77-A301-0D448BA84B5F}"/>
-              </a:ext>
-            </a:extLst>
-          </p:cNvPr>
-          <p:cNvPicPr>
-            <a:picLocks noChangeAspect="1" noChangeArrowheads="1"/>
-          </p:cNvPicPr>
-          <p:nvPr/>
-        </p:nvPicPr>
-        <p:blipFill>
-          <a:blip r:embed="rId2">
-            <a:extLst>
-              <a:ext uri="{28A0092B-C50C-407E-A947-70E740481C1C}">
-                <a14:useLocalDpi xmlns:a14="http://schemas.microsoft.com/office/drawing/2010/main" val="0"/>
-              </a:ext>
-            </a:extLst>
-          </a:blip>
-          <a:srcRect/>
-          <a:stretch>
-            <a:fillRect/>
-          </a:stretch>
-        </p:blipFill>
-        <p:spPr bwMode="auto">
-          <a:xfrm>
-            <a:off x="6018600" y="560880"/>
-            <a:ext cx="4897049" cy="5736240"/>
-          </a:xfrm>
-          <a:prstGeom prst="rect">
-            <a:avLst/>
-          </a:prstGeom>
-          <a:noFill/>
-          <a:extLst>
-            <a:ext uri="{909E8E84-426E-40DD-AFC4-6F175D3DCCD1}">
-              <a14:hiddenFill xmlns:a14="http://schemas.microsoft.com/office/drawing/2010/main">
-                <a:solidFill>
-                  <a:srgbClr val="FFFFFF"/>
-                </a:solidFill>
-              </a14:hiddenFill>
-            </a:ext>
-          </a:extLst>
-        </p:spPr>
-      </p:pic>
-    </p:spTree>
-    <p:extLst>
-      <p:ext uri="{BB962C8B-B14F-4D97-AF65-F5344CB8AC3E}">
-        <p14:creationId xmlns:p14="http://schemas.microsoft.com/office/powerpoint/2010/main" val="1786910798"/>
-      </p:ext>
-    </p:extLst>
-  </p:cSld>
-  <p:clrMapOvr>
-    <a:masterClrMapping/>
-  </p:clrMapOvr>
-</p:sld>
-</file>
-
-<file path=ppt/slides/slide6.xml><?xml version="1.0" encoding="utf-8"?>
-<p:sld xmlns:a="http://schemas.openxmlformats.org/drawingml/2006/main" xmlns:r="http://schemas.openxmlformats.org/officeDocument/2006/relationships" xmlns:p="http://schemas.openxmlformats.org/presentationml/2006/main">
-  <p:cSld>
-    <p:spTree>
-      <p:nvGrpSpPr>
-        <p:cNvPr id="1" name=""/>
-        <p:cNvGrpSpPr/>
-        <p:nvPr/>
-      </p:nvGrpSpPr>
-      <p:grpSpPr>
-        <a:xfrm>
-          <a:off x="0" y="0"/>
-          <a:ext cx="0" cy="0"/>
-          <a:chOff x="0" y="0"/>
-          <a:chExt cx="0" cy="0"/>
-        </a:xfrm>
-      </p:grpSpPr>
-      <p:sp>
-        <p:nvSpPr>
-          <p:cNvPr id="2" name="Title 1">
-            <a:extLst>
-              <a:ext uri="{FF2B5EF4-FFF2-40B4-BE49-F238E27FC236}">
-                <a16:creationId xmlns:a16="http://schemas.microsoft.com/office/drawing/2014/main" id="{1E90F863-7245-4F5E-AC76-10526DDD63DA}"/>
-              </a:ext>
-            </a:extLst>
-          </p:cNvPr>
-          <p:cNvSpPr>
-            <a:spLocks noGrp="1"/>
-          </p:cNvSpPr>
-          <p:nvPr>
-            <p:ph type="title"/>
-          </p:nvPr>
-        </p:nvSpPr>
-        <p:spPr/>
-        <p:txBody>
-          <a:bodyPr/>
-          <a:lstStyle/>
-          <a:p>
-            <a:r>
-              <a:rPr lang="en-US" dirty="0"/>
-              <a:t>Simple Demo Monolith Application</a:t>
-            </a:r>
-          </a:p>
-        </p:txBody>
-      </p:sp>
-      <p:sp>
-        <p:nvSpPr>
-          <p:cNvPr id="3" name="Content Placeholder 2">
-            <a:extLst>
-              <a:ext uri="{FF2B5EF4-FFF2-40B4-BE49-F238E27FC236}">
-                <a16:creationId xmlns:a16="http://schemas.microsoft.com/office/drawing/2014/main" id="{089AAAB4-3304-4D3C-8EF1-E6D9780ED308}"/>
-              </a:ext>
-            </a:extLst>
-          </p:cNvPr>
-          <p:cNvSpPr>
-            <a:spLocks noGrp="1"/>
-          </p:cNvSpPr>
-          <p:nvPr>
-            <p:ph idx="1"/>
-          </p:nvPr>
-        </p:nvSpPr>
-        <p:spPr>
-          <a:xfrm>
-            <a:off x="4665403" y="1930400"/>
-            <a:ext cx="5980296" cy="3880773"/>
-          </a:xfrm>
-        </p:spPr>
-        <p:txBody>
-          <a:bodyPr/>
-          <a:lstStyle/>
-          <a:p>
-            <a:endParaRPr lang="en-US" dirty="0"/>
-          </a:p>
-        </p:txBody>
-      </p:sp>
-      <p:sp>
-        <p:nvSpPr>
-          <p:cNvPr id="4" name="Cube 3">
-            <a:extLst>
-              <a:ext uri="{FF2B5EF4-FFF2-40B4-BE49-F238E27FC236}">
-                <a16:creationId xmlns:a16="http://schemas.microsoft.com/office/drawing/2014/main" id="{98DFCB3F-89C8-4906-9934-CAD16DC16716}"/>
-              </a:ext>
-            </a:extLst>
-          </p:cNvPr>
-          <p:cNvSpPr/>
-          <p:nvPr/>
-        </p:nvSpPr>
-        <p:spPr>
-          <a:xfrm>
-            <a:off x="783685" y="1511920"/>
-            <a:ext cx="3540330" cy="4299253"/>
-          </a:xfrm>
-          <a:prstGeom prst="cube">
-            <a:avLst>
-              <a:gd name="adj" fmla="val 3619"/>
-            </a:avLst>
-          </a:prstGeom>
-        </p:spPr>
-        <p:style>
-          <a:lnRef idx="1">
-            <a:schemeClr val="dk1"/>
-          </a:lnRef>
-          <a:fillRef idx="2">
-            <a:schemeClr val="dk1"/>
-          </a:fillRef>
-          <a:effectRef idx="1">
-            <a:schemeClr val="dk1"/>
-          </a:effectRef>
-          <a:fontRef idx="minor">
-            <a:schemeClr val="dk1"/>
-          </a:fontRef>
-        </p:style>
-        <p:txBody>
-          <a:bodyPr rtlCol="0" anchor="ctr"/>
-          <a:lstStyle/>
-          <a:p>
-            <a:pPr algn="ctr"/>
-            <a:r>
-              <a:rPr lang="en-US" sz="1400" dirty="0"/>
-              <a:t>Spring Boot with Embedded Tomcat</a:t>
-            </a:r>
-          </a:p>
-          <a:p>
-            <a:pPr algn="ctr"/>
-            <a:endParaRPr lang="en-US" sz="1400" dirty="0"/>
-          </a:p>
-          <a:p>
-            <a:pPr algn="ctr"/>
-            <a:endParaRPr lang="en-US" sz="1400" dirty="0"/>
-          </a:p>
-          <a:p>
-            <a:pPr algn="ctr"/>
-            <a:endParaRPr lang="en-US" sz="1400" dirty="0"/>
-          </a:p>
-          <a:p>
-            <a:pPr algn="ctr"/>
-            <a:endParaRPr lang="en-US" sz="1400" dirty="0"/>
-          </a:p>
-          <a:p>
-            <a:pPr algn="ctr"/>
-            <a:endParaRPr lang="en-US" sz="1400" dirty="0"/>
-          </a:p>
-          <a:p>
-            <a:pPr algn="ctr"/>
-            <a:endParaRPr lang="en-US" sz="1400" dirty="0"/>
-          </a:p>
-          <a:p>
-            <a:pPr algn="ctr"/>
-            <a:endParaRPr lang="en-US" dirty="0"/>
-          </a:p>
-          <a:p>
-            <a:pPr algn="ctr"/>
-            <a:endParaRPr lang="en-US" dirty="0"/>
-          </a:p>
-          <a:p>
-            <a:pPr algn="ctr"/>
-            <a:endParaRPr lang="en-US" dirty="0"/>
-          </a:p>
-          <a:p>
-            <a:pPr algn="ctr"/>
-            <a:endParaRPr lang="en-US" dirty="0"/>
-          </a:p>
-          <a:p>
-            <a:pPr algn="ctr"/>
-            <a:endParaRPr lang="en-US" dirty="0"/>
-          </a:p>
-          <a:p>
-            <a:pPr algn="ctr"/>
-            <a:endParaRPr lang="en-US" dirty="0"/>
-          </a:p>
-          <a:p>
-            <a:pPr algn="ctr"/>
-            <a:endParaRPr lang="en-US" dirty="0"/>
-          </a:p>
-          <a:p>
-            <a:pPr algn="ctr"/>
-            <a:endParaRPr lang="en-US" dirty="0"/>
-          </a:p>
-          <a:p>
-            <a:pPr algn="ctr"/>
-            <a:endParaRPr lang="en-US" dirty="0"/>
-          </a:p>
-        </p:txBody>
-      </p:sp>
-      <p:sp>
-        <p:nvSpPr>
-          <p:cNvPr id="5" name="Flowchart: Magnetic Disk 4">
-            <a:extLst>
-              <a:ext uri="{FF2B5EF4-FFF2-40B4-BE49-F238E27FC236}">
-                <a16:creationId xmlns:a16="http://schemas.microsoft.com/office/drawing/2014/main" id="{5143B72C-7B07-4320-A1F7-9F1275B90C18}"/>
-              </a:ext>
-            </a:extLst>
-          </p:cNvPr>
-          <p:cNvSpPr/>
-          <p:nvPr/>
-        </p:nvSpPr>
-        <p:spPr>
-          <a:xfrm>
-            <a:off x="1301038" y="4476911"/>
-            <a:ext cx="2290942" cy="1194458"/>
-          </a:xfrm>
-          <a:prstGeom prst="flowChartMagneticDisk">
-            <a:avLst/>
-          </a:prstGeom>
-          <a:solidFill>
-            <a:srgbClr val="E3D14B"/>
-          </a:solidFill>
-        </p:spPr>
-        <p:style>
-          <a:lnRef idx="2">
-            <a:schemeClr val="dk1"/>
-          </a:lnRef>
-          <a:fillRef idx="1">
-            <a:schemeClr val="lt1"/>
-          </a:fillRef>
-          <a:effectRef idx="0">
-            <a:schemeClr val="dk1"/>
-          </a:effectRef>
-          <a:fontRef idx="minor">
-            <a:schemeClr val="dk1"/>
-          </a:fontRef>
-        </p:style>
-        <p:txBody>
-          <a:bodyPr rtlCol="0" anchor="ctr"/>
-          <a:lstStyle/>
-          <a:p>
-            <a:pPr algn="ctr"/>
-            <a:r>
-              <a:rPr lang="en-US" dirty="0"/>
-              <a:t>H2 Database</a:t>
-            </a:r>
-          </a:p>
-        </p:txBody>
-      </p:sp>
-      <p:sp>
-        <p:nvSpPr>
-          <p:cNvPr id="9" name="Arrow: Up-Down 8">
-            <a:extLst>
-              <a:ext uri="{FF2B5EF4-FFF2-40B4-BE49-F238E27FC236}">
-                <a16:creationId xmlns:a16="http://schemas.microsoft.com/office/drawing/2014/main" id="{EE0BC73C-3D0D-4BFB-902F-3070D4583D58}"/>
-              </a:ext>
-            </a:extLst>
-          </p:cNvPr>
-          <p:cNvSpPr/>
-          <p:nvPr/>
-        </p:nvSpPr>
-        <p:spPr>
-          <a:xfrm>
-            <a:off x="2275452" y="4245574"/>
-            <a:ext cx="342115" cy="506943"/>
-          </a:xfrm>
-          <a:prstGeom prst="upDownArrow">
-            <a:avLst/>
-          </a:prstGeom>
-        </p:spPr>
-        <p:style>
-          <a:lnRef idx="1">
-            <a:schemeClr val="dk1"/>
-          </a:lnRef>
-          <a:fillRef idx="2">
-            <a:schemeClr val="dk1"/>
-          </a:fillRef>
-          <a:effectRef idx="1">
-            <a:schemeClr val="dk1"/>
-          </a:effectRef>
-          <a:fontRef idx="minor">
-            <a:schemeClr val="dk1"/>
-          </a:fontRef>
-        </p:style>
-        <p:txBody>
-          <a:bodyPr rtlCol="0" anchor="ctr"/>
-          <a:lstStyle/>
-          <a:p>
-            <a:pPr algn="ctr"/>
-            <a:endParaRPr lang="en-US" dirty="0"/>
-          </a:p>
-        </p:txBody>
-      </p:sp>
-      <p:sp>
-        <p:nvSpPr>
-          <p:cNvPr id="6" name="Cube 5">
-            <a:extLst>
-              <a:ext uri="{FF2B5EF4-FFF2-40B4-BE49-F238E27FC236}">
-                <a16:creationId xmlns:a16="http://schemas.microsoft.com/office/drawing/2014/main" id="{2AB05551-08F8-4251-B30F-9203DA470ED0}"/>
-              </a:ext>
-            </a:extLst>
-          </p:cNvPr>
-          <p:cNvSpPr/>
-          <p:nvPr/>
-        </p:nvSpPr>
-        <p:spPr>
-          <a:xfrm>
-            <a:off x="1031629" y="3318791"/>
-            <a:ext cx="2915489" cy="1023101"/>
-          </a:xfrm>
-          <a:prstGeom prst="cube">
-            <a:avLst>
-              <a:gd name="adj" fmla="val 51041"/>
-            </a:avLst>
-          </a:prstGeom>
-        </p:spPr>
-        <p:style>
-          <a:lnRef idx="0">
-            <a:schemeClr val="accent2"/>
-          </a:lnRef>
-          <a:fillRef idx="3">
-            <a:schemeClr val="accent2"/>
-          </a:fillRef>
-          <a:effectRef idx="3">
-            <a:schemeClr val="accent2"/>
-          </a:effectRef>
-          <a:fontRef idx="minor">
-            <a:schemeClr val="lt1"/>
-          </a:fontRef>
-        </p:style>
-        <p:txBody>
-          <a:bodyPr rtlCol="0" anchor="ctr"/>
-          <a:lstStyle/>
-          <a:p>
-            <a:pPr algn="ctr"/>
-            <a:r>
-              <a:rPr lang="en-US" sz="1600" dirty="0"/>
-              <a:t>User CRUD Repository</a:t>
-            </a:r>
-          </a:p>
-        </p:txBody>
-      </p:sp>
-      <p:sp>
-        <p:nvSpPr>
-          <p:cNvPr id="7" name="Cube 6">
-            <a:extLst>
-              <a:ext uri="{FF2B5EF4-FFF2-40B4-BE49-F238E27FC236}">
-                <a16:creationId xmlns:a16="http://schemas.microsoft.com/office/drawing/2014/main" id="{FED9477D-3E08-43DF-95E7-45F1B670CB14}"/>
-              </a:ext>
-            </a:extLst>
-          </p:cNvPr>
-          <p:cNvSpPr/>
-          <p:nvPr/>
-        </p:nvSpPr>
-        <p:spPr>
-          <a:xfrm>
-            <a:off x="1031631" y="2708774"/>
-            <a:ext cx="2915489" cy="1023101"/>
-          </a:xfrm>
-          <a:prstGeom prst="cube">
-            <a:avLst>
-              <a:gd name="adj" fmla="val 51041"/>
-            </a:avLst>
-          </a:prstGeom>
-        </p:spPr>
-        <p:style>
-          <a:lnRef idx="1">
-            <a:schemeClr val="accent4"/>
-          </a:lnRef>
-          <a:fillRef idx="2">
-            <a:schemeClr val="accent4"/>
-          </a:fillRef>
-          <a:effectRef idx="1">
-            <a:schemeClr val="accent4"/>
-          </a:effectRef>
-          <a:fontRef idx="minor">
-            <a:schemeClr val="dk1"/>
-          </a:fontRef>
-        </p:style>
-        <p:txBody>
-          <a:bodyPr rtlCol="0" anchor="ctr"/>
-          <a:lstStyle/>
-          <a:p>
-            <a:pPr algn="ctr"/>
-            <a:r>
-              <a:rPr lang="en-US" dirty="0">
-                <a:solidFill>
-                  <a:schemeClr val="bg1"/>
-                </a:solidFill>
-              </a:rPr>
-              <a:t>User Service Layer</a:t>
-            </a:r>
-          </a:p>
-        </p:txBody>
-      </p:sp>
-      <p:sp>
-        <p:nvSpPr>
-          <p:cNvPr id="8" name="Cube 7">
-            <a:extLst>
-              <a:ext uri="{FF2B5EF4-FFF2-40B4-BE49-F238E27FC236}">
-                <a16:creationId xmlns:a16="http://schemas.microsoft.com/office/drawing/2014/main" id="{1E2D6D15-9257-4A57-8FE4-B37E7A4DD203}"/>
-              </a:ext>
-            </a:extLst>
-          </p:cNvPr>
-          <p:cNvSpPr/>
-          <p:nvPr/>
-        </p:nvSpPr>
-        <p:spPr>
-          <a:xfrm>
-            <a:off x="1031631" y="2090662"/>
-            <a:ext cx="2915488" cy="1023101"/>
-          </a:xfrm>
-          <a:prstGeom prst="cube">
-            <a:avLst>
-              <a:gd name="adj" fmla="val 51041"/>
-            </a:avLst>
-          </a:prstGeom>
-        </p:spPr>
-        <p:style>
-          <a:lnRef idx="2">
-            <a:schemeClr val="accent1">
-              <a:shade val="50000"/>
-            </a:schemeClr>
-          </a:lnRef>
-          <a:fillRef idx="1">
-            <a:schemeClr val="accent1"/>
-          </a:fillRef>
-          <a:effectRef idx="0">
-            <a:schemeClr val="accent1"/>
-          </a:effectRef>
-          <a:fontRef idx="minor">
-            <a:schemeClr val="lt1"/>
-          </a:fontRef>
-        </p:style>
-        <p:txBody>
-          <a:bodyPr rtlCol="0" anchor="ctr"/>
-          <a:lstStyle/>
-          <a:p>
-            <a:pPr algn="ctr"/>
-            <a:r>
-              <a:rPr lang="en-US" dirty="0"/>
-              <a:t>User REST Controller</a:t>
-            </a:r>
-          </a:p>
-        </p:txBody>
-      </p:sp>
-      <p:sp>
-        <p:nvSpPr>
-          <p:cNvPr id="10" name="Cube 9">
-            <a:extLst>
-              <a:ext uri="{FF2B5EF4-FFF2-40B4-BE49-F238E27FC236}">
-                <a16:creationId xmlns:a16="http://schemas.microsoft.com/office/drawing/2014/main" id="{496A86B9-3CA1-4A5E-89BC-0C6A0F637B85}"/>
-              </a:ext>
-            </a:extLst>
-          </p:cNvPr>
-          <p:cNvSpPr/>
-          <p:nvPr/>
-        </p:nvSpPr>
-        <p:spPr>
-          <a:xfrm>
-            <a:off x="3559562" y="2302475"/>
-            <a:ext cx="423065" cy="1943099"/>
-          </a:xfrm>
-          <a:prstGeom prst="cube">
-            <a:avLst>
-              <a:gd name="adj" fmla="val 39339"/>
-            </a:avLst>
-          </a:prstGeom>
-          <a:solidFill>
-            <a:schemeClr val="dk1">
-              <a:alpha val="50000"/>
-            </a:schemeClr>
-          </a:solidFill>
-          <a:ln>
-            <a:noFill/>
-          </a:ln>
-        </p:spPr>
-        <p:style>
-          <a:lnRef idx="0">
-            <a:scrgbClr r="0" g="0" b="0"/>
-          </a:lnRef>
-          <a:fillRef idx="0">
-            <a:scrgbClr r="0" g="0" b="0"/>
-          </a:fillRef>
-          <a:effectRef idx="0">
-            <a:scrgbClr r="0" g="0" b="0"/>
-          </a:effectRef>
-          <a:fontRef idx="minor">
-            <a:schemeClr val="lt1"/>
-          </a:fontRef>
-        </p:style>
-        <p:txBody>
-          <a:bodyPr rtlCol="0" anchor="ctr"/>
-          <a:lstStyle/>
-          <a:p>
-            <a:pPr algn="ctr"/>
-            <a:endParaRPr lang="en-US" dirty="0"/>
-          </a:p>
-        </p:txBody>
-      </p:sp>
-      <p:sp>
-        <p:nvSpPr>
-          <p:cNvPr id="11" name="TextBox 10">
-            <a:extLst>
-              <a:ext uri="{FF2B5EF4-FFF2-40B4-BE49-F238E27FC236}">
-                <a16:creationId xmlns:a16="http://schemas.microsoft.com/office/drawing/2014/main" id="{B9081AC4-DB10-4E4A-9182-A404E0020DC6}"/>
-              </a:ext>
-            </a:extLst>
-          </p:cNvPr>
-          <p:cNvSpPr txBox="1"/>
-          <p:nvPr/>
-        </p:nvSpPr>
-        <p:spPr>
-          <a:xfrm rot="16200000">
-            <a:off x="3189356" y="2948422"/>
-            <a:ext cx="1320802" cy="615553"/>
-          </a:xfrm>
-          <a:prstGeom prst="rect">
-            <a:avLst/>
-          </a:prstGeom>
-          <a:noFill/>
-        </p:spPr>
-        <p:txBody>
-          <a:bodyPr wrap="square" rtlCol="0">
-            <a:spAutoFit/>
-          </a:bodyPr>
-          <a:lstStyle/>
-          <a:p>
-            <a:r>
-              <a:rPr lang="en-US" sz="1600" dirty="0">
-                <a:solidFill>
-                  <a:schemeClr val="bg1">
-                    <a:lumMod val="65000"/>
-                  </a:schemeClr>
-                </a:solidFill>
-              </a:rPr>
-              <a:t>DI + Config</a:t>
-            </a:r>
-          </a:p>
-          <a:p>
-            <a:endParaRPr lang="en-US" dirty="0">
-              <a:solidFill>
-                <a:schemeClr val="bg1">
-                  <a:lumMod val="65000"/>
-                </a:schemeClr>
-              </a:solidFill>
-            </a:endParaRPr>
-          </a:p>
-        </p:txBody>
-      </p:sp>
-    </p:spTree>
-    <p:extLst>
-      <p:ext uri="{BB962C8B-B14F-4D97-AF65-F5344CB8AC3E}">
-        <p14:creationId xmlns:p14="http://schemas.microsoft.com/office/powerpoint/2010/main" val="1308168526"/>
-      </p:ext>
-    </p:extLst>
-  </p:cSld>
-  <p:clrMapOvr>
-    <a:masterClrMapping/>
-  </p:clrMapOvr>
-</p:sld>
-</file>
-
-<file path=ppt/slides/slide7.xml><?xml version="1.0" encoding="utf-8"?>
-<p:sld xmlns:a="http://schemas.openxmlformats.org/drawingml/2006/main" xmlns:r="http://schemas.openxmlformats.org/officeDocument/2006/relationships" xmlns:p="http://schemas.openxmlformats.org/presentationml/2006/main">
-  <p:cSld>
-    <p:spTree>
-      <p:nvGrpSpPr>
-        <p:cNvPr id="1" name=""/>
-        <p:cNvGrpSpPr/>
-        <p:nvPr/>
-      </p:nvGrpSpPr>
-      <p:grpSpPr>
-        <a:xfrm>
-          <a:off x="0" y="0"/>
-          <a:ext cx="0" cy="0"/>
-          <a:chOff x="0" y="0"/>
-          <a:chExt cx="0" cy="0"/>
-        </a:xfrm>
-      </p:grpSpPr>
-      <p:sp>
-        <p:nvSpPr>
-          <p:cNvPr id="2" name="Title 1">
-            <a:extLst>
-              <a:ext uri="{FF2B5EF4-FFF2-40B4-BE49-F238E27FC236}">
-                <a16:creationId xmlns:a16="http://schemas.microsoft.com/office/drawing/2014/main" id="{6C612B7F-2017-4ED0-90AF-480D67295A93}"/>
-              </a:ext>
-            </a:extLst>
-          </p:cNvPr>
-          <p:cNvSpPr>
-            <a:spLocks noGrp="1"/>
-          </p:cNvSpPr>
-          <p:nvPr>
-            <p:ph type="title"/>
-          </p:nvPr>
-        </p:nvSpPr>
-        <p:spPr/>
-        <p:txBody>
-          <a:bodyPr/>
-          <a:lstStyle/>
-          <a:p>
-            <a:r>
-              <a:rPr lang="en-US" dirty="0"/>
-              <a:t>Application Structure</a:t>
-            </a:r>
-          </a:p>
-        </p:txBody>
-      </p:sp>
-      <p:pic>
-        <p:nvPicPr>
-          <p:cNvPr id="6" name="Picture 5">
-            <a:extLst>
-              <a:ext uri="{FF2B5EF4-FFF2-40B4-BE49-F238E27FC236}">
-                <a16:creationId xmlns:a16="http://schemas.microsoft.com/office/drawing/2014/main" id="{D6F44436-E4A5-465A-97B6-FDADEB6A7A4E}"/>
-              </a:ext>
-            </a:extLst>
-          </p:cNvPr>
-          <p:cNvPicPr>
-            <a:picLocks noChangeAspect="1"/>
-          </p:cNvPicPr>
-          <p:nvPr/>
-        </p:nvPicPr>
-        <p:blipFill>
-          <a:blip r:embed="rId2"/>
-          <a:stretch>
-            <a:fillRect/>
-          </a:stretch>
-        </p:blipFill>
-        <p:spPr>
-          <a:xfrm>
-            <a:off x="4167454" y="1318417"/>
-            <a:ext cx="5972175" cy="1819275"/>
-          </a:xfrm>
-          <a:prstGeom prst="rect">
-            <a:avLst/>
-          </a:prstGeom>
-          <a:ln>
-            <a:noFill/>
-          </a:ln>
-          <a:effectLst>
-            <a:outerShdw blurRad="190500" algn="tl" rotWithShape="0">
-              <a:srgbClr val="000000">
-                <a:alpha val="70000"/>
-              </a:srgbClr>
-            </a:outerShdw>
-          </a:effectLst>
-        </p:spPr>
-      </p:pic>
-      <p:pic>
-        <p:nvPicPr>
-          <p:cNvPr id="11" name="Picture 10">
-            <a:extLst>
-              <a:ext uri="{FF2B5EF4-FFF2-40B4-BE49-F238E27FC236}">
-                <a16:creationId xmlns:a16="http://schemas.microsoft.com/office/drawing/2014/main" id="{8CEE68FD-30C9-4841-B116-3D73136FEABB}"/>
-              </a:ext>
-            </a:extLst>
-          </p:cNvPr>
-          <p:cNvPicPr>
-            <a:picLocks noChangeAspect="1"/>
-          </p:cNvPicPr>
-          <p:nvPr/>
-        </p:nvPicPr>
-        <p:blipFill>
-          <a:blip r:embed="rId3"/>
-          <a:stretch>
-            <a:fillRect/>
-          </a:stretch>
-        </p:blipFill>
-        <p:spPr>
-          <a:xfrm>
-            <a:off x="3674268" y="3717906"/>
-            <a:ext cx="4476750" cy="2800350"/>
-          </a:xfrm>
-          <a:prstGeom prst="rect">
-            <a:avLst/>
-          </a:prstGeom>
-          <a:ln>
-            <a:noFill/>
-          </a:ln>
-          <a:effectLst>
-            <a:outerShdw blurRad="190500" algn="tl" rotWithShape="0">
-              <a:srgbClr val="000000">
-                <a:alpha val="70000"/>
-              </a:srgbClr>
-            </a:outerShdw>
-          </a:effectLst>
-        </p:spPr>
-      </p:pic>
-      <p:pic>
-        <p:nvPicPr>
-          <p:cNvPr id="9" name="Picture 8">
-            <a:extLst>
-              <a:ext uri="{FF2B5EF4-FFF2-40B4-BE49-F238E27FC236}">
-                <a16:creationId xmlns:a16="http://schemas.microsoft.com/office/drawing/2014/main" id="{988DC9EB-E8D2-4EFE-8CA4-0F0E34CAD798}"/>
-              </a:ext>
-            </a:extLst>
-          </p:cNvPr>
-          <p:cNvPicPr>
-            <a:picLocks noChangeAspect="1"/>
-          </p:cNvPicPr>
-          <p:nvPr/>
-        </p:nvPicPr>
-        <p:blipFill>
-          <a:blip r:embed="rId4"/>
-          <a:stretch>
-            <a:fillRect/>
-          </a:stretch>
-        </p:blipFill>
-        <p:spPr>
-          <a:xfrm>
-            <a:off x="710062" y="1697026"/>
-            <a:ext cx="2619375" cy="3028950"/>
-          </a:xfrm>
-          <a:prstGeom prst="rect">
-            <a:avLst/>
-          </a:prstGeom>
-          <a:ln>
-            <a:noFill/>
-          </a:ln>
-          <a:effectLst>
-            <a:outerShdw blurRad="190500" algn="tl" rotWithShape="0">
-              <a:srgbClr val="000000">
-                <a:alpha val="70000"/>
-              </a:srgbClr>
-            </a:outerShdw>
-          </a:effectLst>
-        </p:spPr>
-      </p:pic>
-      <p:pic>
-        <p:nvPicPr>
-          <p:cNvPr id="7" name="Picture 6">
-            <a:extLst>
-              <a:ext uri="{FF2B5EF4-FFF2-40B4-BE49-F238E27FC236}">
-                <a16:creationId xmlns:a16="http://schemas.microsoft.com/office/drawing/2014/main" id="{4F6758DB-4AF8-4391-952E-70DAC0E4DD1A}"/>
-              </a:ext>
-            </a:extLst>
-          </p:cNvPr>
-          <p:cNvPicPr>
-            <a:picLocks noChangeAspect="1"/>
-          </p:cNvPicPr>
-          <p:nvPr/>
-        </p:nvPicPr>
-        <p:blipFill>
-          <a:blip r:embed="rId5"/>
-          <a:stretch>
-            <a:fillRect/>
-          </a:stretch>
-        </p:blipFill>
-        <p:spPr>
-          <a:xfrm>
-            <a:off x="8388965" y="2844788"/>
-            <a:ext cx="3429000" cy="2924175"/>
-          </a:xfrm>
-          <a:prstGeom prst="rect">
-            <a:avLst/>
-          </a:prstGeom>
-          <a:ln>
-            <a:noFill/>
-          </a:ln>
-          <a:effectLst>
-            <a:outerShdw blurRad="190500" algn="tl" rotWithShape="0">
-              <a:srgbClr val="000000">
-                <a:alpha val="70000"/>
-              </a:srgbClr>
-            </a:outerShdw>
-          </a:effectLst>
-        </p:spPr>
-      </p:pic>
-      <p:cxnSp>
-        <p:nvCxnSpPr>
-          <p:cNvPr id="13" name="Straight Arrow Connector 12">
-            <a:extLst>
-              <a:ext uri="{FF2B5EF4-FFF2-40B4-BE49-F238E27FC236}">
-                <a16:creationId xmlns:a16="http://schemas.microsoft.com/office/drawing/2014/main" id="{2CFC4D7C-0AD7-4703-B64F-DE79F30AE5C3}"/>
-              </a:ext>
-            </a:extLst>
-          </p:cNvPr>
-          <p:cNvCxnSpPr>
-            <a:cxnSpLocks/>
-          </p:cNvCxnSpPr>
-          <p:nvPr/>
-        </p:nvCxnSpPr>
-        <p:spPr>
-          <a:xfrm flipV="1">
-            <a:off x="3041211" y="2413002"/>
-            <a:ext cx="1283139" cy="720712"/>
-          </a:xfrm>
-          <a:prstGeom prst="straightConnector1">
-            <a:avLst/>
-          </a:prstGeom>
-          <a:ln>
-            <a:tailEnd type="triangle"/>
-          </a:ln>
-        </p:spPr>
-        <p:style>
-          <a:lnRef idx="1">
-            <a:schemeClr val="accent1"/>
-          </a:lnRef>
-          <a:fillRef idx="0">
-            <a:schemeClr val="accent1"/>
-          </a:fillRef>
-          <a:effectRef idx="0">
-            <a:schemeClr val="accent1"/>
-          </a:effectRef>
-          <a:fontRef idx="minor">
-            <a:schemeClr val="tx1"/>
-          </a:fontRef>
-        </p:style>
-      </p:cxnSp>
-      <p:cxnSp>
-        <p:nvCxnSpPr>
-          <p:cNvPr id="14" name="Straight Arrow Connector 13">
-            <a:extLst>
-              <a:ext uri="{FF2B5EF4-FFF2-40B4-BE49-F238E27FC236}">
-                <a16:creationId xmlns:a16="http://schemas.microsoft.com/office/drawing/2014/main" id="{D222603C-C9B7-4913-9A13-1CDA6EDFA776}"/>
-              </a:ext>
-            </a:extLst>
-          </p:cNvPr>
-          <p:cNvCxnSpPr>
-            <a:cxnSpLocks/>
-          </p:cNvCxnSpPr>
-          <p:nvPr/>
-        </p:nvCxnSpPr>
-        <p:spPr>
-          <a:xfrm flipV="1">
-            <a:off x="2984606" y="3354377"/>
-            <a:ext cx="5529944" cy="1"/>
-          </a:xfrm>
-          <a:prstGeom prst="straightConnector1">
-            <a:avLst/>
-          </a:prstGeom>
-          <a:ln>
-            <a:tailEnd type="triangle"/>
-          </a:ln>
-        </p:spPr>
-        <p:style>
-          <a:lnRef idx="1">
-            <a:schemeClr val="accent1"/>
-          </a:lnRef>
-          <a:fillRef idx="0">
-            <a:schemeClr val="accent1"/>
-          </a:fillRef>
-          <a:effectRef idx="0">
-            <a:schemeClr val="accent1"/>
-          </a:effectRef>
-          <a:fontRef idx="minor">
-            <a:schemeClr val="tx1"/>
-          </a:fontRef>
-        </p:style>
-      </p:cxnSp>
-      <p:cxnSp>
-        <p:nvCxnSpPr>
-          <p:cNvPr id="19" name="Straight Arrow Connector 18">
-            <a:extLst>
-              <a:ext uri="{FF2B5EF4-FFF2-40B4-BE49-F238E27FC236}">
-                <a16:creationId xmlns:a16="http://schemas.microsoft.com/office/drawing/2014/main" id="{FAAB1B5F-D089-4815-AEEF-6C4F1056194D}"/>
-              </a:ext>
-            </a:extLst>
-          </p:cNvPr>
-          <p:cNvCxnSpPr>
-            <a:cxnSpLocks/>
-          </p:cNvCxnSpPr>
-          <p:nvPr/>
-        </p:nvCxnSpPr>
-        <p:spPr>
-          <a:xfrm>
-            <a:off x="2975772" y="4022712"/>
-            <a:ext cx="958053" cy="885834"/>
-          </a:xfrm>
-          <a:prstGeom prst="straightConnector1">
-            <a:avLst/>
-          </a:prstGeom>
-          <a:ln>
-            <a:tailEnd type="triangle"/>
-          </a:ln>
-        </p:spPr>
-        <p:style>
-          <a:lnRef idx="1">
-            <a:schemeClr val="accent1"/>
-          </a:lnRef>
-          <a:fillRef idx="0">
-            <a:schemeClr val="accent1"/>
-          </a:fillRef>
-          <a:effectRef idx="0">
-            <a:schemeClr val="accent1"/>
-          </a:effectRef>
-          <a:fontRef idx="minor">
-            <a:schemeClr val="tx1"/>
-          </a:fontRef>
-        </p:style>
-      </p:cxnSp>
-      <p:sp>
-        <p:nvSpPr>
-          <p:cNvPr id="23" name="TextBox 22">
-            <a:extLst>
-              <a:ext uri="{FF2B5EF4-FFF2-40B4-BE49-F238E27FC236}">
-                <a16:creationId xmlns:a16="http://schemas.microsoft.com/office/drawing/2014/main" id="{5670C0E2-53C1-4C52-889A-BF5607944E71}"/>
-              </a:ext>
-            </a:extLst>
-          </p:cNvPr>
-          <p:cNvSpPr txBox="1"/>
-          <p:nvPr/>
-        </p:nvSpPr>
-        <p:spPr>
-          <a:xfrm>
-            <a:off x="7252855" y="1484745"/>
-            <a:ext cx="1796326" cy="369332"/>
-          </a:xfrm>
-          <a:prstGeom prst="rect">
-            <a:avLst/>
-          </a:prstGeom>
-          <a:noFill/>
-        </p:spPr>
-        <p:txBody>
-          <a:bodyPr wrap="none" rtlCol="0">
-            <a:spAutoFit/>
-          </a:bodyPr>
-          <a:lstStyle/>
-          <a:p>
-            <a:r>
-              <a:rPr lang="en-US" dirty="0"/>
-              <a:t>REST Controller</a:t>
-            </a:r>
-          </a:p>
-        </p:txBody>
-      </p:sp>
-      <p:sp>
-        <p:nvSpPr>
-          <p:cNvPr id="24" name="TextBox 23">
-            <a:extLst>
-              <a:ext uri="{FF2B5EF4-FFF2-40B4-BE49-F238E27FC236}">
-                <a16:creationId xmlns:a16="http://schemas.microsoft.com/office/drawing/2014/main" id="{5C1BE107-83E3-4020-9BE0-11437947AAF5}"/>
-              </a:ext>
-            </a:extLst>
-          </p:cNvPr>
-          <p:cNvSpPr txBox="1"/>
-          <p:nvPr/>
-        </p:nvSpPr>
-        <p:spPr>
-          <a:xfrm>
-            <a:off x="9698410" y="2985045"/>
-            <a:ext cx="1342034" cy="369332"/>
-          </a:xfrm>
-          <a:prstGeom prst="rect">
-            <a:avLst/>
-          </a:prstGeom>
-          <a:noFill/>
-        </p:spPr>
-        <p:txBody>
-          <a:bodyPr wrap="none" rtlCol="0">
-            <a:spAutoFit/>
-          </a:bodyPr>
-          <a:lstStyle/>
-          <a:p>
-            <a:r>
-              <a:rPr lang="en-US" dirty="0"/>
-              <a:t>Data Entity</a:t>
-            </a:r>
-          </a:p>
-        </p:txBody>
-      </p:sp>
-      <p:sp>
-        <p:nvSpPr>
-          <p:cNvPr id="25" name="TextBox 24">
-            <a:extLst>
-              <a:ext uri="{FF2B5EF4-FFF2-40B4-BE49-F238E27FC236}">
-                <a16:creationId xmlns:a16="http://schemas.microsoft.com/office/drawing/2014/main" id="{FDAE5E4D-F8B3-45CE-95AF-F8373E5F7C40}"/>
-              </a:ext>
-            </a:extLst>
-          </p:cNvPr>
-          <p:cNvSpPr txBox="1"/>
-          <p:nvPr/>
-        </p:nvSpPr>
-        <p:spPr>
-          <a:xfrm>
-            <a:off x="6539386" y="3744374"/>
-            <a:ext cx="1459054" cy="369332"/>
-          </a:xfrm>
-          <a:prstGeom prst="rect">
-            <a:avLst/>
-          </a:prstGeom>
-          <a:noFill/>
-        </p:spPr>
-        <p:txBody>
-          <a:bodyPr wrap="none" rtlCol="0">
-            <a:spAutoFit/>
-          </a:bodyPr>
-          <a:lstStyle/>
-          <a:p>
-            <a:r>
-              <a:rPr lang="en-US" dirty="0"/>
-              <a:t>User Service</a:t>
-            </a:r>
-          </a:p>
-        </p:txBody>
-      </p:sp>
-      <p:pic>
-        <p:nvPicPr>
-          <p:cNvPr id="26" name="Picture 25">
-            <a:extLst>
-              <a:ext uri="{FF2B5EF4-FFF2-40B4-BE49-F238E27FC236}">
-                <a16:creationId xmlns:a16="http://schemas.microsoft.com/office/drawing/2014/main" id="{3A42C8AA-7B75-4647-B136-A8AEF3F960C6}"/>
-              </a:ext>
-            </a:extLst>
-          </p:cNvPr>
-          <p:cNvPicPr>
-            <a:picLocks noChangeAspect="1"/>
-          </p:cNvPicPr>
-          <p:nvPr/>
-        </p:nvPicPr>
-        <p:blipFill>
-          <a:blip r:embed="rId6"/>
-          <a:stretch>
-            <a:fillRect/>
-          </a:stretch>
-        </p:blipFill>
-        <p:spPr>
-          <a:xfrm>
-            <a:off x="150196" y="5313339"/>
-            <a:ext cx="3286125" cy="1000125"/>
-          </a:xfrm>
-          <a:prstGeom prst="rect">
-            <a:avLst/>
-          </a:prstGeom>
-          <a:ln>
-            <a:noFill/>
-          </a:ln>
-          <a:effectLst>
-            <a:outerShdw blurRad="190500" algn="tl" rotWithShape="0">
-              <a:srgbClr val="000000">
-                <a:alpha val="70000"/>
-              </a:srgbClr>
-            </a:outerShdw>
-          </a:effectLst>
-        </p:spPr>
-      </p:pic>
-      <p:cxnSp>
-        <p:nvCxnSpPr>
-          <p:cNvPr id="27" name="Straight Arrow Connector 26">
-            <a:extLst>
-              <a:ext uri="{FF2B5EF4-FFF2-40B4-BE49-F238E27FC236}">
-                <a16:creationId xmlns:a16="http://schemas.microsoft.com/office/drawing/2014/main" id="{AA9D2FCD-2285-4871-96AE-F9C363988409}"/>
-              </a:ext>
-            </a:extLst>
-          </p:cNvPr>
-          <p:cNvCxnSpPr>
-            <a:cxnSpLocks/>
-          </p:cNvCxnSpPr>
-          <p:nvPr/>
-        </p:nvCxnSpPr>
-        <p:spPr>
-          <a:xfrm>
-            <a:off x="2180706" y="4465629"/>
-            <a:ext cx="0" cy="1068396"/>
-          </a:xfrm>
-          <a:prstGeom prst="straightConnector1">
-            <a:avLst/>
-          </a:prstGeom>
-          <a:ln>
-            <a:tailEnd type="triangle"/>
-          </a:ln>
-        </p:spPr>
-        <p:style>
-          <a:lnRef idx="1">
-            <a:schemeClr val="accent1"/>
-          </a:lnRef>
-          <a:fillRef idx="0">
-            <a:schemeClr val="accent1"/>
-          </a:fillRef>
-          <a:effectRef idx="0">
-            <a:schemeClr val="accent1"/>
-          </a:effectRef>
-          <a:fontRef idx="minor">
-            <a:schemeClr val="tx1"/>
-          </a:fontRef>
-        </p:style>
-      </p:cxnSp>
-    </p:spTree>
-    <p:extLst>
-      <p:ext uri="{BB962C8B-B14F-4D97-AF65-F5344CB8AC3E}">
-        <p14:creationId xmlns:p14="http://schemas.microsoft.com/office/powerpoint/2010/main" val="3057096331"/>
-      </p:ext>
-    </p:extLst>
-  </p:cSld>
-  <p:clrMapOvr>
-    <a:masterClrMapping/>
-  </p:clrMapOvr>
-</p:sld>
-</file>
-
-<file path=ppt/slides/slide8.xml><?xml version="1.0" encoding="utf-8"?>
-<p:sld xmlns:a="http://schemas.openxmlformats.org/drawingml/2006/main" xmlns:r="http://schemas.openxmlformats.org/officeDocument/2006/relationships" xmlns:p="http://schemas.openxmlformats.org/presentationml/2006/main">
-  <p:cSld>
-    <p:spTree>
-      <p:nvGrpSpPr>
-        <p:cNvPr id="1" name=""/>
-        <p:cNvGrpSpPr/>
-        <p:nvPr/>
-      </p:nvGrpSpPr>
-      <p:grpSpPr>
-        <a:xfrm>
-          <a:off x="0" y="0"/>
-          <a:ext cx="0" cy="0"/>
-          <a:chOff x="0" y="0"/>
-          <a:chExt cx="0" cy="0"/>
-        </a:xfrm>
-      </p:grpSpPr>
-      <p:sp>
-        <p:nvSpPr>
-          <p:cNvPr id="2" name="Title 1">
-            <a:extLst>
-              <a:ext uri="{FF2B5EF4-FFF2-40B4-BE49-F238E27FC236}">
-                <a16:creationId xmlns:a16="http://schemas.microsoft.com/office/drawing/2014/main" id="{F2629303-85DB-4937-B161-D3D0A370B6F4}"/>
-              </a:ext>
-            </a:extLst>
-          </p:cNvPr>
-          <p:cNvSpPr>
-            <a:spLocks noGrp="1"/>
-          </p:cNvSpPr>
-          <p:nvPr>
-            <p:ph type="title"/>
-          </p:nvPr>
-        </p:nvSpPr>
-        <p:spPr/>
-        <p:txBody>
-          <a:bodyPr/>
-          <a:lstStyle/>
-          <a:p>
-            <a:r>
-              <a:rPr lang="en-US" dirty="0"/>
-              <a:t>Spring Boot</a:t>
-            </a:r>
-          </a:p>
-        </p:txBody>
-      </p:sp>
-      <p:sp>
-        <p:nvSpPr>
-          <p:cNvPr id="3" name="Content Placeholder 2">
-            <a:extLst>
-              <a:ext uri="{FF2B5EF4-FFF2-40B4-BE49-F238E27FC236}">
-                <a16:creationId xmlns:a16="http://schemas.microsoft.com/office/drawing/2014/main" id="{5F0D7F9F-01D7-4DDC-927A-7072BCADE3D8}"/>
-              </a:ext>
-            </a:extLst>
-          </p:cNvPr>
-          <p:cNvSpPr>
-            <a:spLocks noGrp="1"/>
-          </p:cNvSpPr>
-          <p:nvPr>
-            <p:ph idx="1"/>
-          </p:nvPr>
-        </p:nvSpPr>
-        <p:spPr/>
-        <p:txBody>
-          <a:bodyPr/>
-          <a:lstStyle/>
-          <a:p>
-            <a:endParaRPr lang="en-US" dirty="0"/>
-          </a:p>
-        </p:txBody>
-      </p:sp>
-    </p:spTree>
-    <p:extLst>
-      <p:ext uri="{BB962C8B-B14F-4D97-AF65-F5344CB8AC3E}">
-        <p14:creationId xmlns:p14="http://schemas.microsoft.com/office/powerpoint/2010/main" val="1200986383"/>
-      </p:ext>
-    </p:extLst>
-  </p:cSld>
-  <p:clrMapOvr>
-    <a:masterClrMapping/>
-  </p:clrMapOvr>
-</p:sld>
-</file>
-
-<file path=ppt/slides/slide9.xml><?xml version="1.0" encoding="utf-8"?>
-<p:sld xmlns:a="http://schemas.openxmlformats.org/drawingml/2006/main" xmlns:r="http://schemas.openxmlformats.org/officeDocument/2006/relationships" xmlns:p="http://schemas.openxmlformats.org/presentationml/2006/main">
-  <p:cSld>
-    <p:spTree>
-      <p:nvGrpSpPr>
-        <p:cNvPr id="1" name=""/>
-        <p:cNvGrpSpPr/>
-        <p:nvPr/>
-      </p:nvGrpSpPr>
-      <p:grpSpPr>
-        <a:xfrm>
-          <a:off x="0" y="0"/>
-          <a:ext cx="0" cy="0"/>
-          <a:chOff x="0" y="0"/>
-          <a:chExt cx="0" cy="0"/>
-        </a:xfrm>
-      </p:grpSpPr>
-      <p:sp>
-        <p:nvSpPr>
-          <p:cNvPr id="2" name="Title 1">
-            <a:extLst>
-              <a:ext uri="{FF2B5EF4-FFF2-40B4-BE49-F238E27FC236}">
-                <a16:creationId xmlns:a16="http://schemas.microsoft.com/office/drawing/2014/main" id="{CB939AEC-6CEE-446F-9D1A-1A1963C88EB4}"/>
-              </a:ext>
-            </a:extLst>
-          </p:cNvPr>
-          <p:cNvSpPr>
-            <a:spLocks noGrp="1"/>
-          </p:cNvSpPr>
-          <p:nvPr>
-            <p:ph type="title"/>
-          </p:nvPr>
-        </p:nvSpPr>
-        <p:spPr/>
-        <p:txBody>
-          <a:bodyPr/>
-          <a:lstStyle/>
-          <a:p>
-            <a:r>
-              <a:rPr lang="en-US" dirty="0"/>
-              <a:t>Controller/Service/Repository</a:t>
-            </a:r>
-          </a:p>
-        </p:txBody>
-      </p:sp>
-      <p:sp>
-        <p:nvSpPr>
-          <p:cNvPr id="3" name="Content Placeholder 2">
-            <a:extLst>
-              <a:ext uri="{FF2B5EF4-FFF2-40B4-BE49-F238E27FC236}">
-                <a16:creationId xmlns:a16="http://schemas.microsoft.com/office/drawing/2014/main" id="{1BB4E9D8-9442-43DD-8F0B-EDBC194697E3}"/>
-              </a:ext>
-            </a:extLst>
-          </p:cNvPr>
-          <p:cNvSpPr>
-            <a:spLocks noGrp="1"/>
-          </p:cNvSpPr>
-          <p:nvPr>
-            <p:ph idx="1"/>
-          </p:nvPr>
-        </p:nvSpPr>
-        <p:spPr/>
-        <p:txBody>
-          <a:bodyPr>
-            <a:normAutofit fontScale="62500" lnSpcReduction="20000"/>
-          </a:bodyPr>
-          <a:lstStyle/>
-          <a:p>
-            <a:r>
-              <a:rPr lang="en-US" dirty="0" err="1"/>
-              <a:t>myview</a:t>
-            </a:r>
-            <a:r>
-              <a:rPr lang="en-US" dirty="0"/>
-              <a:t> &lt;-&gt; </a:t>
-            </a:r>
-            <a:r>
-              <a:rPr lang="en-US" dirty="0" err="1"/>
-              <a:t>MyController</a:t>
-            </a:r>
-            <a:r>
-              <a:rPr lang="en-US" dirty="0"/>
-              <a:t> &lt;- </a:t>
-            </a:r>
-            <a:r>
-              <a:rPr lang="en-US" dirty="0" err="1"/>
-              <a:t>MyService</a:t>
-            </a:r>
-            <a:r>
-              <a:rPr lang="en-US" dirty="0"/>
-              <a:t> &lt;- </a:t>
-            </a:r>
-            <a:r>
-              <a:rPr lang="en-US" dirty="0" err="1"/>
-              <a:t>MyDAO</a:t>
-            </a:r>
-            <a:endParaRPr lang="en-US" dirty="0"/>
-          </a:p>
-          <a:p>
-            <a:r>
-              <a:rPr lang="en-US" dirty="0"/>
-              <a:t>                 ^</a:t>
-            </a:r>
-          </a:p>
-          <a:p>
-            <a:r>
-              <a:rPr lang="en-US" dirty="0"/>
-              <a:t>                 |</a:t>
-            </a:r>
-          </a:p>
-          <a:p>
-            <a:r>
-              <a:rPr lang="en-US" dirty="0"/>
-              <a:t>               </a:t>
-            </a:r>
-            <a:r>
-              <a:rPr lang="en-US" dirty="0" err="1"/>
-              <a:t>MyHelper</a:t>
-            </a:r>
-            <a:endParaRPr lang="en-US" dirty="0"/>
-          </a:p>
-          <a:p>
-            <a:r>
-              <a:rPr lang="en-US" dirty="0"/>
-              <a:t>Controllers handled the view resolving.</a:t>
-            </a:r>
-          </a:p>
-          <a:p>
-            <a:r>
-              <a:rPr lang="en-US" dirty="0"/>
-              <a:t>Services handled mapping from </a:t>
-            </a:r>
-            <a:r>
-              <a:rPr lang="en-US" dirty="0" err="1"/>
-              <a:t>dto</a:t>
-            </a:r>
-            <a:r>
-              <a:rPr lang="en-US" dirty="0"/>
-              <a:t>-s to model objects for view and vice versa,</a:t>
-            </a:r>
-          </a:p>
-          <a:p>
-            <a:r>
-              <a:rPr lang="en-US" dirty="0"/>
-              <a:t>DAO-s handled database transactions and,</a:t>
-            </a:r>
-          </a:p>
-          <a:p>
-            <a:r>
-              <a:rPr lang="en-US" dirty="0"/>
-              <a:t>Helpers handled everything else including validation.</a:t>
-            </a:r>
-          </a:p>
-          <a:p>
-            <a:endParaRPr lang="en-US" dirty="0"/>
-          </a:p>
-          <a:p>
-            <a:r>
-              <a:rPr lang="en-US" dirty="0"/>
-              <a:t>Service layer provides code modularity, the business logic and rules are specified in the service layer which in turn calls DAO layer ,the DAO layer is then only responsible for interacting with DB.</a:t>
-            </a:r>
-          </a:p>
-          <a:p>
-            <a:r>
-              <a:rPr lang="en-US" dirty="0"/>
-              <a:t>you get to make a clear distinction between web type activity best done in the controller and generic business logic that is not web-related. You can test service-related business logic separately from controller logic</a:t>
-            </a:r>
-          </a:p>
-          <a:p>
-            <a:r>
-              <a:rPr lang="en-US" dirty="0"/>
-              <a:t>you get to specify transaction behavior so if you have calls to multiple data access objects you can specify that they occur within the same transaction</a:t>
-            </a:r>
-          </a:p>
-          <a:p>
-            <a:r>
-              <a:rPr lang="en-US" dirty="0"/>
-              <a:t>Repository encapsulates the details of the persistence layer and provide a CRUD interface for a single entity.</a:t>
-            </a:r>
-          </a:p>
-          <a:p>
-            <a:endParaRPr lang="en-US" dirty="0"/>
-          </a:p>
-        </p:txBody>
-      </p:sp>
-      <p:sp>
-        <p:nvSpPr>
-          <p:cNvPr id="5" name="TextBox 4">
-            <a:extLst>
-              <a:ext uri="{FF2B5EF4-FFF2-40B4-BE49-F238E27FC236}">
-                <a16:creationId xmlns:a16="http://schemas.microsoft.com/office/drawing/2014/main" id="{A6F31E81-9612-4FE0-BE57-03249B0C24C3}"/>
-              </a:ext>
-            </a:extLst>
-          </p:cNvPr>
-          <p:cNvSpPr txBox="1"/>
-          <p:nvPr/>
-        </p:nvSpPr>
-        <p:spPr>
-          <a:xfrm>
-            <a:off x="952412" y="5920712"/>
-            <a:ext cx="7207422" cy="1169551"/>
-          </a:xfrm>
-          <a:prstGeom prst="rect">
-            <a:avLst/>
-          </a:prstGeom>
-          <a:noFill/>
-        </p:spPr>
-        <p:txBody>
-          <a:bodyPr wrap="square" rtlCol="0">
-            <a:spAutoFit/>
-          </a:bodyPr>
-          <a:lstStyle/>
-          <a:p>
-            <a:r>
-              <a:rPr lang="en-US" sz="700" dirty="0"/>
-              <a:t>Business Rules</a:t>
-            </a:r>
-          </a:p>
-          <a:p>
-            <a:r>
-              <a:rPr lang="en-US" sz="700" dirty="0"/>
-              <a:t>Business rules are an important part of the business domain. </a:t>
-            </a:r>
-          </a:p>
-          <a:p>
-            <a:r>
-              <a:rPr lang="en-US" sz="700" dirty="0"/>
-              <a:t>They define data validation and other constraints that need </a:t>
-            </a:r>
-          </a:p>
-          <a:p>
-            <a:r>
-              <a:rPr lang="en-US" sz="700" dirty="0"/>
-              <a:t>to be applied on domain objects in specific business process </a:t>
-            </a:r>
-          </a:p>
-          <a:p>
-            <a:r>
-              <a:rPr lang="en-US" sz="700" dirty="0"/>
-              <a:t>scenarios. Business rules typically fall into the following categories:</a:t>
-            </a:r>
-          </a:p>
-          <a:p>
-            <a:pPr marL="285750" indent="-285750">
-              <a:buFont typeface="Arial" panose="020B0604020202020204" pitchFamily="34" charset="0"/>
-              <a:buChar char="•"/>
-            </a:pPr>
-            <a:r>
-              <a:rPr lang="en-US" sz="700" dirty="0"/>
-              <a:t>Data validation</a:t>
-            </a:r>
-          </a:p>
-          <a:p>
-            <a:pPr marL="285750" indent="-285750">
-              <a:buFont typeface="Arial" panose="020B0604020202020204" pitchFamily="34" charset="0"/>
-              <a:buChar char="•"/>
-            </a:pPr>
-            <a:r>
-              <a:rPr lang="en-US" sz="700" dirty="0"/>
-              <a:t>Data transformation</a:t>
-            </a:r>
-          </a:p>
-          <a:p>
-            <a:pPr marL="285750" indent="-285750">
-              <a:buFont typeface="Arial" panose="020B0604020202020204" pitchFamily="34" charset="0"/>
-              <a:buChar char="•"/>
-            </a:pPr>
-            <a:r>
-              <a:rPr lang="en-US" sz="700" dirty="0"/>
-              <a:t>Business decision-making</a:t>
-            </a:r>
-          </a:p>
-          <a:p>
-            <a:pPr marL="285750" indent="-285750">
-              <a:buFont typeface="Arial" panose="020B0604020202020204" pitchFamily="34" charset="0"/>
-              <a:buChar char="•"/>
-            </a:pPr>
-            <a:r>
-              <a:rPr lang="en-US" sz="700" dirty="0"/>
-              <a:t>Process routing (work-flow logic)</a:t>
-            </a:r>
-          </a:p>
-          <a:p>
-            <a:endParaRPr lang="en-US" sz="700" dirty="0"/>
-          </a:p>
-        </p:txBody>
-      </p:sp>
-    </p:spTree>
-    <p:extLst>
-      <p:ext uri="{BB962C8B-B14F-4D97-AF65-F5344CB8AC3E}">
-        <p14:creationId xmlns:p14="http://schemas.microsoft.com/office/powerpoint/2010/main" val="2893478696"/>
       </p:ext>
     </p:extLst>
   </p:cSld>

</xml_diff>